<commit_message>
Work on simple single source
</commit_message>
<xml_diff>
--- a/reports/work_diary.pptx
+++ b/reports/work_diary.pptx
@@ -8,6 +8,7 @@
     <p:sldId id="256" r:id="rId2"/>
     <p:sldId id="257" r:id="rId3"/>
     <p:sldId id="258" r:id="rId4"/>
+    <p:sldId id="259" r:id="rId5"/>
   </p:sldIdLst>
   <p:sldSz cx="12192000" cy="6858000"/>
   <p:notesSz cx="6858000" cy="9144000"/>
@@ -106,13 +107,18 @@
       </a:defRPr>
     </a:lvl9pPr>
   </p:defaultTextStyle>
+  <p:extLst>
+    <p:ext uri="{EFAFB233-063F-42B5-8137-9DF3F51BA10A}">
+      <p15:sldGuideLst xmlns:p15="http://schemas.microsoft.com/office/powerpoint/2012/main"/>
+    </p:ext>
+  </p:extLst>
 </p:presentation>
 </file>
 
 <file path=ppt/revisionInfo.xml><?xml version="1.0" encoding="utf-8"?>
 <p1510:revInfo xmlns:a="http://schemas.openxmlformats.org/drawingml/2006/main" xmlns:r="http://schemas.openxmlformats.org/officeDocument/2006/relationships" xmlns:p1510="http://schemas.microsoft.com/office/powerpoint/2015/10/main">
   <p1510:revLst>
-    <p1510:client id="{196519FD-3C64-4461-AC3D-BB99B1B5B961}" v="3" dt="2022-11-04T14:23:28.004"/>
+    <p1510:client id="{196519FD-3C64-4461-AC3D-BB99B1B5B961}" v="4" dt="2022-11-07T13:47:28.249"/>
   </p1510:revLst>
 </p1510:revInfo>
 </file>
@@ -122,7 +128,7 @@
   <pc:docChgLst>
     <pc:chgData name="urh trinko" userId="3b62f928bb6fe22b" providerId="LiveId" clId="{196519FD-3C64-4461-AC3D-BB99B1B5B961}"/>
     <pc:docChg chg="custSel addSld delSld modSld">
-      <pc:chgData name="urh trinko" userId="3b62f928bb6fe22b" providerId="LiveId" clId="{196519FD-3C64-4461-AC3D-BB99B1B5B961}" dt="2022-11-04T14:23:41.459" v="1179" actId="1076"/>
+      <pc:chgData name="urh trinko" userId="3b62f928bb6fe22b" providerId="LiveId" clId="{196519FD-3C64-4461-AC3D-BB99B1B5B961}" dt="2022-11-07T13:48:09.708" v="1614" actId="20577"/>
       <pc:docMkLst>
         <pc:docMk/>
       </pc:docMkLst>
@@ -242,6 +248,37 @@
           </ac:picMkLst>
         </pc:picChg>
       </pc:sldChg>
+      <pc:sldChg chg="addSp modSp new mod">
+        <pc:chgData name="urh trinko" userId="3b62f928bb6fe22b" providerId="LiveId" clId="{196519FD-3C64-4461-AC3D-BB99B1B5B961}" dt="2022-11-07T13:48:09.708" v="1614" actId="20577"/>
+        <pc:sldMkLst>
+          <pc:docMk/>
+          <pc:sldMk cId="3443113254" sldId="259"/>
+        </pc:sldMkLst>
+        <pc:spChg chg="mod">
+          <ac:chgData name="urh trinko" userId="3b62f928bb6fe22b" providerId="LiveId" clId="{196519FD-3C64-4461-AC3D-BB99B1B5B961}" dt="2022-11-07T13:44:00.598" v="1189" actId="20577"/>
+          <ac:spMkLst>
+            <pc:docMk/>
+            <pc:sldMk cId="3443113254" sldId="259"/>
+            <ac:spMk id="2" creationId="{E1367B17-FDD9-D3FC-7813-AE87317D0B8F}"/>
+          </ac:spMkLst>
+        </pc:spChg>
+        <pc:spChg chg="mod">
+          <ac:chgData name="urh trinko" userId="3b62f928bb6fe22b" providerId="LiveId" clId="{196519FD-3C64-4461-AC3D-BB99B1B5B961}" dt="2022-11-07T13:48:09.708" v="1614" actId="20577"/>
+          <ac:spMkLst>
+            <pc:docMk/>
+            <pc:sldMk cId="3443113254" sldId="259"/>
+            <ac:spMk id="3" creationId="{9476A664-65B7-2D24-15E5-BD8E1C2271C2}"/>
+          </ac:spMkLst>
+        </pc:spChg>
+        <pc:picChg chg="add mod">
+          <ac:chgData name="urh trinko" userId="3b62f928bb6fe22b" providerId="LiveId" clId="{196519FD-3C64-4461-AC3D-BB99B1B5B961}" dt="2022-11-07T13:47:34.515" v="1568" actId="1076"/>
+          <ac:picMkLst>
+            <pc:docMk/>
+            <pc:sldMk cId="3443113254" sldId="259"/>
+            <ac:picMk id="5" creationId="{E5C4A90C-E5C5-DF81-8A5E-462750C135D1}"/>
+          </ac:picMkLst>
+        </pc:picChg>
+      </pc:sldChg>
     </pc:docChg>
   </pc:docChgLst>
 </pc:chgInfo>
@@ -394,7 +431,7 @@
           <a:p>
             <a:fld id="{4C35B1A2-9590-42BA-8C8F-FDB479B04EEB}" type="datetimeFigureOut">
               <a:rPr lang="sl-SI" smtClean="0"/>
-              <a:t>4. 11. 2022</a:t>
+              <a:t>7. 11. 2022</a:t>
             </a:fld>
             <a:endParaRPr lang="sl-SI"/>
           </a:p>
@@ -592,7 +629,7 @@
           <a:p>
             <a:fld id="{4C35B1A2-9590-42BA-8C8F-FDB479B04EEB}" type="datetimeFigureOut">
               <a:rPr lang="sl-SI" smtClean="0"/>
-              <a:t>4. 11. 2022</a:t>
+              <a:t>7. 11. 2022</a:t>
             </a:fld>
             <a:endParaRPr lang="sl-SI"/>
           </a:p>
@@ -800,7 +837,7 @@
           <a:p>
             <a:fld id="{4C35B1A2-9590-42BA-8C8F-FDB479B04EEB}" type="datetimeFigureOut">
               <a:rPr lang="sl-SI" smtClean="0"/>
-              <a:t>4. 11. 2022</a:t>
+              <a:t>7. 11. 2022</a:t>
             </a:fld>
             <a:endParaRPr lang="sl-SI"/>
           </a:p>
@@ -998,7 +1035,7 @@
           <a:p>
             <a:fld id="{4C35B1A2-9590-42BA-8C8F-FDB479B04EEB}" type="datetimeFigureOut">
               <a:rPr lang="sl-SI" smtClean="0"/>
-              <a:t>4. 11. 2022</a:t>
+              <a:t>7. 11. 2022</a:t>
             </a:fld>
             <a:endParaRPr lang="sl-SI"/>
           </a:p>
@@ -1273,7 +1310,7 @@
           <a:p>
             <a:fld id="{4C35B1A2-9590-42BA-8C8F-FDB479B04EEB}" type="datetimeFigureOut">
               <a:rPr lang="sl-SI" smtClean="0"/>
-              <a:t>4. 11. 2022</a:t>
+              <a:t>7. 11. 2022</a:t>
             </a:fld>
             <a:endParaRPr lang="sl-SI"/>
           </a:p>
@@ -1538,7 +1575,7 @@
           <a:p>
             <a:fld id="{4C35B1A2-9590-42BA-8C8F-FDB479B04EEB}" type="datetimeFigureOut">
               <a:rPr lang="sl-SI" smtClean="0"/>
-              <a:t>4. 11. 2022</a:t>
+              <a:t>7. 11. 2022</a:t>
             </a:fld>
             <a:endParaRPr lang="sl-SI"/>
           </a:p>
@@ -1950,7 +1987,7 @@
           <a:p>
             <a:fld id="{4C35B1A2-9590-42BA-8C8F-FDB479B04EEB}" type="datetimeFigureOut">
               <a:rPr lang="sl-SI" smtClean="0"/>
-              <a:t>4. 11. 2022</a:t>
+              <a:t>7. 11. 2022</a:t>
             </a:fld>
             <a:endParaRPr lang="sl-SI"/>
           </a:p>
@@ -2091,7 +2128,7 @@
           <a:p>
             <a:fld id="{4C35B1A2-9590-42BA-8C8F-FDB479B04EEB}" type="datetimeFigureOut">
               <a:rPr lang="sl-SI" smtClean="0"/>
-              <a:t>4. 11. 2022</a:t>
+              <a:t>7. 11. 2022</a:t>
             </a:fld>
             <a:endParaRPr lang="sl-SI"/>
           </a:p>
@@ -2204,7 +2241,7 @@
           <a:p>
             <a:fld id="{4C35B1A2-9590-42BA-8C8F-FDB479B04EEB}" type="datetimeFigureOut">
               <a:rPr lang="sl-SI" smtClean="0"/>
-              <a:t>4. 11. 2022</a:t>
+              <a:t>7. 11. 2022</a:t>
             </a:fld>
             <a:endParaRPr lang="sl-SI"/>
           </a:p>
@@ -2515,7 +2552,7 @@
           <a:p>
             <a:fld id="{4C35B1A2-9590-42BA-8C8F-FDB479B04EEB}" type="datetimeFigureOut">
               <a:rPr lang="sl-SI" smtClean="0"/>
-              <a:t>4. 11. 2022</a:t>
+              <a:t>7. 11. 2022</a:t>
             </a:fld>
             <a:endParaRPr lang="sl-SI"/>
           </a:p>
@@ -2803,7 +2840,7 @@
           <a:p>
             <a:fld id="{4C35B1A2-9590-42BA-8C8F-FDB479B04EEB}" type="datetimeFigureOut">
               <a:rPr lang="sl-SI" smtClean="0"/>
-              <a:t>4. 11. 2022</a:t>
+              <a:t>7. 11. 2022</a:t>
             </a:fld>
             <a:endParaRPr lang="sl-SI"/>
           </a:p>
@@ -3044,7 +3081,7 @@
           <a:p>
             <a:fld id="{4C35B1A2-9590-42BA-8C8F-FDB479B04EEB}" type="datetimeFigureOut">
               <a:rPr lang="sl-SI" smtClean="0"/>
-              <a:t>4. 11. 2022</a:t>
+              <a:t>7. 11. 2022</a:t>
             </a:fld>
             <a:endParaRPr lang="sl-SI"/>
           </a:p>
@@ -3725,6 +3762,143 @@
 </p:sld>
 </file>
 
+<file path=ppt/slides/slide4.xml><?xml version="1.0" encoding="utf-8"?>
+<p:sld xmlns:a="http://schemas.openxmlformats.org/drawingml/2006/main" xmlns:r="http://schemas.openxmlformats.org/officeDocument/2006/relationships" xmlns:p="http://schemas.openxmlformats.org/presentationml/2006/main">
+  <p:cSld>
+    <p:spTree>
+      <p:nvGrpSpPr>
+        <p:cNvPr id="1" name=""/>
+        <p:cNvGrpSpPr/>
+        <p:nvPr/>
+      </p:nvGrpSpPr>
+      <p:grpSpPr>
+        <a:xfrm>
+          <a:off x="0" y="0"/>
+          <a:ext cx="0" cy="0"/>
+          <a:chOff x="0" y="0"/>
+          <a:chExt cx="0" cy="0"/>
+        </a:xfrm>
+      </p:grpSpPr>
+      <p:sp>
+        <p:nvSpPr>
+          <p:cNvPr id="2" name="Naslov 1">
+            <a:extLst>
+              <a:ext uri="{FF2B5EF4-FFF2-40B4-BE49-F238E27FC236}">
+                <a16:creationId xmlns:a16="http://schemas.microsoft.com/office/drawing/2014/main" id="{E1367B17-FDD9-D3FC-7813-AE87317D0B8F}"/>
+              </a:ext>
+            </a:extLst>
+          </p:cNvPr>
+          <p:cNvSpPr>
+            <a:spLocks noGrp="1"/>
+          </p:cNvSpPr>
+          <p:nvPr>
+            <p:ph type="title"/>
+          </p:nvPr>
+        </p:nvSpPr>
+        <p:spPr/>
+        <p:txBody>
+          <a:bodyPr/>
+          <a:lstStyle/>
+          <a:p>
+            <a:r>
+              <a:rPr lang="en-SI" dirty="0"/>
+              <a:t>7.11.2022</a:t>
+            </a:r>
+            <a:endParaRPr lang="sl-SI" dirty="0"/>
+          </a:p>
+        </p:txBody>
+      </p:sp>
+      <p:sp>
+        <p:nvSpPr>
+          <p:cNvPr id="3" name="Označba mesta vsebine 2">
+            <a:extLst>
+              <a:ext uri="{FF2B5EF4-FFF2-40B4-BE49-F238E27FC236}">
+                <a16:creationId xmlns:a16="http://schemas.microsoft.com/office/drawing/2014/main" id="{9476A664-65B7-2D24-15E5-BD8E1C2271C2}"/>
+              </a:ext>
+            </a:extLst>
+          </p:cNvPr>
+          <p:cNvSpPr>
+            <a:spLocks noGrp="1"/>
+          </p:cNvSpPr>
+          <p:nvPr>
+            <p:ph idx="1"/>
+          </p:nvPr>
+        </p:nvSpPr>
+        <p:spPr>
+          <a:xfrm>
+            <a:off x="838200" y="1825625"/>
+            <a:ext cx="4376057" cy="4351338"/>
+          </a:xfrm>
+        </p:spPr>
+        <p:txBody>
+          <a:bodyPr>
+            <a:normAutofit fontScale="92500"/>
+          </a:bodyPr>
+          <a:lstStyle/>
+          <a:p>
+            <a:r>
+              <a:rPr lang="en-SI" dirty="0"/>
+              <a:t>Improvement of the point source location by using multiple different intensities to get multiple circle centres.</a:t>
+            </a:r>
+          </a:p>
+          <a:p>
+            <a:r>
+              <a:rPr lang="en-SI" dirty="0"/>
+              <a:t>Some of them are then eliminated because they are to far, but the remaining (green points on bottom image) are averaged to get the estimation of the point source (black dot).</a:t>
+            </a:r>
+            <a:endParaRPr lang="sl-SI" dirty="0"/>
+          </a:p>
+        </p:txBody>
+      </p:sp>
+      <p:pic>
+        <p:nvPicPr>
+          <p:cNvPr id="5" name="Slika 4">
+            <a:extLst>
+              <a:ext uri="{FF2B5EF4-FFF2-40B4-BE49-F238E27FC236}">
+                <a16:creationId xmlns:a16="http://schemas.microsoft.com/office/drawing/2014/main" id="{E5C4A90C-E5C5-DF81-8A5E-462750C135D1}"/>
+              </a:ext>
+            </a:extLst>
+          </p:cNvPr>
+          <p:cNvPicPr>
+            <a:picLocks noChangeAspect="1"/>
+          </p:cNvPicPr>
+          <p:nvPr/>
+        </p:nvPicPr>
+        <p:blipFill>
+          <a:blip r:embed="rId2">
+            <a:extLst>
+              <a:ext uri="{28A0092B-C50C-407E-A947-70E740481C1C}">
+                <a14:useLocalDpi xmlns:a14="http://schemas.microsoft.com/office/drawing/2010/main" val="0"/>
+              </a:ext>
+            </a:extLst>
+          </a:blip>
+          <a:stretch>
+            <a:fillRect/>
+          </a:stretch>
+        </p:blipFill>
+        <p:spPr>
+          <a:xfrm>
+            <a:off x="5089750" y="365125"/>
+            <a:ext cx="6176963" cy="6176963"/>
+          </a:xfrm>
+          <a:prstGeom prst="rect">
+            <a:avLst/>
+          </a:prstGeom>
+        </p:spPr>
+      </p:pic>
+    </p:spTree>
+    <p:extLst>
+      <p:ext uri="{BB962C8B-B14F-4D97-AF65-F5344CB8AC3E}">
+        <p14:creationId xmlns:p14="http://schemas.microsoft.com/office/powerpoint/2010/main" val="3443113254"/>
+      </p:ext>
+    </p:extLst>
+  </p:cSld>
+  <p:clrMapOvr>
+    <a:masterClrMapping/>
+  </p:clrMapOvr>
+</p:sld>
+</file>
+
 <file path=ppt/theme/theme1.xml><?xml version="1.0" encoding="utf-8"?>
 <a:theme xmlns:a="http://schemas.openxmlformats.org/drawingml/2006/main" name="Officeova tema">
   <a:themeElements>

</xml_diff>

<commit_message>
Work on simple point source code
</commit_message>
<xml_diff>
--- a/reports/work_diary.pptx
+++ b/reports/work_diary.pptx
@@ -10,6 +10,7 @@
     <p:sldId id="258" r:id="rId4"/>
     <p:sldId id="259" r:id="rId5"/>
     <p:sldId id="260" r:id="rId6"/>
+    <p:sldId id="261" r:id="rId7"/>
   </p:sldIdLst>
   <p:sldSz cx="12192000" cy="6858000"/>
   <p:notesSz cx="6858000" cy="9144000"/>
@@ -119,7 +120,7 @@
 <file path=ppt/revisionInfo.xml><?xml version="1.0" encoding="utf-8"?>
 <p1510:revInfo xmlns:a="http://schemas.openxmlformats.org/drawingml/2006/main" xmlns:r="http://schemas.openxmlformats.org/officeDocument/2006/relationships" xmlns:p1510="http://schemas.microsoft.com/office/powerpoint/2015/10/main">
   <p1510:revLst>
-    <p1510:client id="{196519FD-3C64-4461-AC3D-BB99B1B5B961}" v="4" dt="2022-11-07T13:47:28.249"/>
+    <p1510:client id="{196519FD-3C64-4461-AC3D-BB99B1B5B961}" v="5" dt="2022-11-10T13:52:27.892"/>
   </p1510:revLst>
 </p1510:revInfo>
 </file>
@@ -129,7 +130,7 @@
   <pc:docChgLst>
     <pc:chgData name="urh trinko" userId="3b62f928bb6fe22b" providerId="LiveId" clId="{196519FD-3C64-4461-AC3D-BB99B1B5B961}"/>
     <pc:docChg chg="undo custSel addSld delSld modSld">
-      <pc:chgData name="urh trinko" userId="3b62f928bb6fe22b" providerId="LiveId" clId="{196519FD-3C64-4461-AC3D-BB99B1B5B961}" dt="2022-11-08T13:08:52.124" v="2271" actId="1076"/>
+      <pc:chgData name="urh trinko" userId="3b62f928bb6fe22b" providerId="LiveId" clId="{196519FD-3C64-4461-AC3D-BB99B1B5B961}" dt="2022-11-10T13:55:26.089" v="3027" actId="14100"/>
       <pc:docMkLst>
         <pc:docMk/>
       </pc:docMkLst>
@@ -281,7 +282,7 @@
         </pc:picChg>
       </pc:sldChg>
       <pc:sldChg chg="modSp new mod">
-        <pc:chgData name="urh trinko" userId="3b62f928bb6fe22b" providerId="LiveId" clId="{196519FD-3C64-4461-AC3D-BB99B1B5B961}" dt="2022-11-08T13:07:29.019" v="2169" actId="14100"/>
+        <pc:chgData name="urh trinko" userId="3b62f928bb6fe22b" providerId="LiveId" clId="{196519FD-3C64-4461-AC3D-BB99B1B5B961}" dt="2022-11-10T13:39:34.355" v="2289" actId="20577"/>
         <pc:sldMkLst>
           <pc:docMk/>
           <pc:sldMk cId="793568323" sldId="260"/>
@@ -295,13 +296,44 @@
           </ac:spMkLst>
         </pc:spChg>
         <pc:spChg chg="mod">
-          <ac:chgData name="urh trinko" userId="3b62f928bb6fe22b" providerId="LiveId" clId="{196519FD-3C64-4461-AC3D-BB99B1B5B961}" dt="2022-11-08T13:07:29.019" v="2169" actId="14100"/>
+          <ac:chgData name="urh trinko" userId="3b62f928bb6fe22b" providerId="LiveId" clId="{196519FD-3C64-4461-AC3D-BB99B1B5B961}" dt="2022-11-10T13:39:34.355" v="2289" actId="20577"/>
           <ac:spMkLst>
             <pc:docMk/>
             <pc:sldMk cId="793568323" sldId="260"/>
             <ac:spMk id="3" creationId="{DC3DA1CD-6710-7C9E-9528-D2F662C163D8}"/>
           </ac:spMkLst>
         </pc:spChg>
+      </pc:sldChg>
+      <pc:sldChg chg="addSp modSp new mod">
+        <pc:chgData name="urh trinko" userId="3b62f928bb6fe22b" providerId="LiveId" clId="{196519FD-3C64-4461-AC3D-BB99B1B5B961}" dt="2022-11-10T13:55:26.089" v="3027" actId="14100"/>
+        <pc:sldMkLst>
+          <pc:docMk/>
+          <pc:sldMk cId="3671714062" sldId="261"/>
+        </pc:sldMkLst>
+        <pc:spChg chg="mod">
+          <ac:chgData name="urh trinko" userId="3b62f928bb6fe22b" providerId="LiveId" clId="{196519FD-3C64-4461-AC3D-BB99B1B5B961}" dt="2022-11-10T13:39:56.145" v="2300" actId="20577"/>
+          <ac:spMkLst>
+            <pc:docMk/>
+            <pc:sldMk cId="3671714062" sldId="261"/>
+            <ac:spMk id="2" creationId="{BA108296-49EB-206A-D460-0D5EF0666809}"/>
+          </ac:spMkLst>
+        </pc:spChg>
+        <pc:spChg chg="mod">
+          <ac:chgData name="urh trinko" userId="3b62f928bb6fe22b" providerId="LiveId" clId="{196519FD-3C64-4461-AC3D-BB99B1B5B961}" dt="2022-11-10T13:55:26.089" v="3027" actId="14100"/>
+          <ac:spMkLst>
+            <pc:docMk/>
+            <pc:sldMk cId="3671714062" sldId="261"/>
+            <ac:spMk id="3" creationId="{8F319AE6-999B-A907-AF7D-83C845FC5016}"/>
+          </ac:spMkLst>
+        </pc:spChg>
+        <pc:picChg chg="add mod">
+          <ac:chgData name="urh trinko" userId="3b62f928bb6fe22b" providerId="LiveId" clId="{196519FD-3C64-4461-AC3D-BB99B1B5B961}" dt="2022-11-10T13:52:59.356" v="2696" actId="1076"/>
+          <ac:picMkLst>
+            <pc:docMk/>
+            <pc:sldMk cId="3671714062" sldId="261"/>
+            <ac:picMk id="5" creationId="{F72E18A0-F49E-775A-10D3-AE8E8AE3DE94}"/>
+          </ac:picMkLst>
+        </pc:picChg>
       </pc:sldChg>
     </pc:docChg>
   </pc:docChgLst>
@@ -455,7 +487,7 @@
           <a:p>
             <a:fld id="{4C35B1A2-9590-42BA-8C8F-FDB479B04EEB}" type="datetimeFigureOut">
               <a:rPr lang="sl-SI" smtClean="0"/>
-              <a:t>8. 11. 2022</a:t>
+              <a:t>10. 11. 2022</a:t>
             </a:fld>
             <a:endParaRPr lang="sl-SI"/>
           </a:p>
@@ -653,7 +685,7 @@
           <a:p>
             <a:fld id="{4C35B1A2-9590-42BA-8C8F-FDB479B04EEB}" type="datetimeFigureOut">
               <a:rPr lang="sl-SI" smtClean="0"/>
-              <a:t>8. 11. 2022</a:t>
+              <a:t>10. 11. 2022</a:t>
             </a:fld>
             <a:endParaRPr lang="sl-SI"/>
           </a:p>
@@ -861,7 +893,7 @@
           <a:p>
             <a:fld id="{4C35B1A2-9590-42BA-8C8F-FDB479B04EEB}" type="datetimeFigureOut">
               <a:rPr lang="sl-SI" smtClean="0"/>
-              <a:t>8. 11. 2022</a:t>
+              <a:t>10. 11. 2022</a:t>
             </a:fld>
             <a:endParaRPr lang="sl-SI"/>
           </a:p>
@@ -1059,7 +1091,7 @@
           <a:p>
             <a:fld id="{4C35B1A2-9590-42BA-8C8F-FDB479B04EEB}" type="datetimeFigureOut">
               <a:rPr lang="sl-SI" smtClean="0"/>
-              <a:t>8. 11. 2022</a:t>
+              <a:t>10. 11. 2022</a:t>
             </a:fld>
             <a:endParaRPr lang="sl-SI"/>
           </a:p>
@@ -1334,7 +1366,7 @@
           <a:p>
             <a:fld id="{4C35B1A2-9590-42BA-8C8F-FDB479B04EEB}" type="datetimeFigureOut">
               <a:rPr lang="sl-SI" smtClean="0"/>
-              <a:t>8. 11. 2022</a:t>
+              <a:t>10. 11. 2022</a:t>
             </a:fld>
             <a:endParaRPr lang="sl-SI"/>
           </a:p>
@@ -1599,7 +1631,7 @@
           <a:p>
             <a:fld id="{4C35B1A2-9590-42BA-8C8F-FDB479B04EEB}" type="datetimeFigureOut">
               <a:rPr lang="sl-SI" smtClean="0"/>
-              <a:t>8. 11. 2022</a:t>
+              <a:t>10. 11. 2022</a:t>
             </a:fld>
             <a:endParaRPr lang="sl-SI"/>
           </a:p>
@@ -2011,7 +2043,7 @@
           <a:p>
             <a:fld id="{4C35B1A2-9590-42BA-8C8F-FDB479B04EEB}" type="datetimeFigureOut">
               <a:rPr lang="sl-SI" smtClean="0"/>
-              <a:t>8. 11. 2022</a:t>
+              <a:t>10. 11. 2022</a:t>
             </a:fld>
             <a:endParaRPr lang="sl-SI"/>
           </a:p>
@@ -2152,7 +2184,7 @@
           <a:p>
             <a:fld id="{4C35B1A2-9590-42BA-8C8F-FDB479B04EEB}" type="datetimeFigureOut">
               <a:rPr lang="sl-SI" smtClean="0"/>
-              <a:t>8. 11. 2022</a:t>
+              <a:t>10. 11. 2022</a:t>
             </a:fld>
             <a:endParaRPr lang="sl-SI"/>
           </a:p>
@@ -2265,7 +2297,7 @@
           <a:p>
             <a:fld id="{4C35B1A2-9590-42BA-8C8F-FDB479B04EEB}" type="datetimeFigureOut">
               <a:rPr lang="sl-SI" smtClean="0"/>
-              <a:t>8. 11. 2022</a:t>
+              <a:t>10. 11. 2022</a:t>
             </a:fld>
             <a:endParaRPr lang="sl-SI"/>
           </a:p>
@@ -2576,7 +2608,7 @@
           <a:p>
             <a:fld id="{4C35B1A2-9590-42BA-8C8F-FDB479B04EEB}" type="datetimeFigureOut">
               <a:rPr lang="sl-SI" smtClean="0"/>
-              <a:t>8. 11. 2022</a:t>
+              <a:t>10. 11. 2022</a:t>
             </a:fld>
             <a:endParaRPr lang="sl-SI"/>
           </a:p>
@@ -2864,7 +2896,7 @@
           <a:p>
             <a:fld id="{4C35B1A2-9590-42BA-8C8F-FDB479B04EEB}" type="datetimeFigureOut">
               <a:rPr lang="sl-SI" smtClean="0"/>
-              <a:t>8. 11. 2022</a:t>
+              <a:t>10. 11. 2022</a:t>
             </a:fld>
             <a:endParaRPr lang="sl-SI"/>
           </a:p>
@@ -3105,7 +3137,7 @@
           <a:p>
             <a:fld id="{4C35B1A2-9590-42BA-8C8F-FDB479B04EEB}" type="datetimeFigureOut">
               <a:rPr lang="sl-SI" smtClean="0"/>
-              <a:t>8. 11. 2022</a:t>
+              <a:t>10. 11. 2022</a:t>
             </a:fld>
             <a:endParaRPr lang="sl-SI"/>
           </a:p>
@@ -4000,12 +4032,14 @@
           </a:xfrm>
         </p:spPr>
         <p:txBody>
-          <a:bodyPr/>
+          <a:bodyPr>
+            <a:normAutofit lnSpcReduction="10000"/>
+          </a:bodyPr>
           <a:lstStyle/>
           <a:p>
             <a:r>
               <a:rPr lang="en-SI" dirty="0"/>
-              <a:t>Improvement of the point source location-finding function. Previously all points outside of the tile with the largest intensity were eliminated. However there are examples in which no points exist inside the “hotspot” tile. This results in an error, because there are no points to average. This is fixed by gradually increasing the size of the area around the “hotspot” tile until at least one point is collected.</a:t>
+              <a:t>Improvement of the point source location-finding function. Previously all points outside of the tile with the largest intensity were eliminated. However there are examples in which no points exist inside the “hotspot” tile. This results in an error, because there are no points to average. This is fixed by gradually increasing the acceptable size of the area around the “hotspot” tile until at least one point is collected.</a:t>
             </a:r>
             <a:endParaRPr lang="sl-SI" dirty="0"/>
           </a:p>
@@ -4015,6 +4049,179 @@
     <p:extLst>
       <p:ext uri="{BB962C8B-B14F-4D97-AF65-F5344CB8AC3E}">
         <p14:creationId xmlns:p14="http://schemas.microsoft.com/office/powerpoint/2010/main" val="793568323"/>
+      </p:ext>
+    </p:extLst>
+  </p:cSld>
+  <p:clrMapOvr>
+    <a:masterClrMapping/>
+  </p:clrMapOvr>
+</p:sld>
+</file>
+
+<file path=ppt/slides/slide6.xml><?xml version="1.0" encoding="utf-8"?>
+<p:sld xmlns:a="http://schemas.openxmlformats.org/drawingml/2006/main" xmlns:r="http://schemas.openxmlformats.org/officeDocument/2006/relationships" xmlns:p="http://schemas.openxmlformats.org/presentationml/2006/main">
+  <p:cSld>
+    <p:spTree>
+      <p:nvGrpSpPr>
+        <p:cNvPr id="1" name=""/>
+        <p:cNvGrpSpPr/>
+        <p:nvPr/>
+      </p:nvGrpSpPr>
+      <p:grpSpPr>
+        <a:xfrm>
+          <a:off x="0" y="0"/>
+          <a:ext cx="0" cy="0"/>
+          <a:chOff x="0" y="0"/>
+          <a:chExt cx="0" cy="0"/>
+        </a:xfrm>
+      </p:grpSpPr>
+      <p:sp>
+        <p:nvSpPr>
+          <p:cNvPr id="2" name="Naslov 1">
+            <a:extLst>
+              <a:ext uri="{FF2B5EF4-FFF2-40B4-BE49-F238E27FC236}">
+                <a16:creationId xmlns:a16="http://schemas.microsoft.com/office/drawing/2014/main" id="{BA108296-49EB-206A-D460-0D5EF0666809}"/>
+              </a:ext>
+            </a:extLst>
+          </p:cNvPr>
+          <p:cNvSpPr>
+            <a:spLocks noGrp="1"/>
+          </p:cNvSpPr>
+          <p:nvPr>
+            <p:ph type="title"/>
+          </p:nvPr>
+        </p:nvSpPr>
+        <p:spPr/>
+        <p:txBody>
+          <a:bodyPr/>
+          <a:lstStyle/>
+          <a:p>
+            <a:r>
+              <a:rPr lang="en-SI" dirty="0"/>
+              <a:t>10.11.2022</a:t>
+            </a:r>
+            <a:endParaRPr lang="sl-SI" dirty="0"/>
+          </a:p>
+        </p:txBody>
+      </p:sp>
+      <p:sp>
+        <p:nvSpPr>
+          <p:cNvPr id="3" name="Označba mesta vsebine 2">
+            <a:extLst>
+              <a:ext uri="{FF2B5EF4-FFF2-40B4-BE49-F238E27FC236}">
+                <a16:creationId xmlns:a16="http://schemas.microsoft.com/office/drawing/2014/main" id="{8F319AE6-999B-A907-AF7D-83C845FC5016}"/>
+              </a:ext>
+            </a:extLst>
+          </p:cNvPr>
+          <p:cNvSpPr>
+            <a:spLocks noGrp="1"/>
+          </p:cNvSpPr>
+          <p:nvPr>
+            <p:ph idx="1"/>
+          </p:nvPr>
+        </p:nvSpPr>
+        <p:spPr>
+          <a:xfrm>
+            <a:off x="609600" y="1499053"/>
+            <a:ext cx="5486400" cy="4847318"/>
+          </a:xfrm>
+        </p:spPr>
+        <p:txBody>
+          <a:bodyPr>
+            <a:normAutofit fontScale="92500" lnSpcReduction="10000"/>
+          </a:bodyPr>
+          <a:lstStyle/>
+          <a:p>
+            <a:r>
+              <a:rPr lang="en-GB" dirty="0"/>
+              <a:t>S</a:t>
+            </a:r>
+            <a:r>
+              <a:rPr lang="en-SI" dirty="0" err="1"/>
+              <a:t>imulating</a:t>
+            </a:r>
+            <a:r>
+              <a:rPr lang="en-SI" dirty="0"/>
+              <a:t> entire code multiple times and collecting the distance between</a:t>
+            </a:r>
+            <a:r>
+              <a:rPr lang="en-GB" dirty="0"/>
+              <a:t>n</a:t>
+            </a:r>
+            <a:r>
+              <a:rPr lang="en-SI" dirty="0"/>
+              <a:t> the original random source and estimated one. Collecting this data and presenting</a:t>
+            </a:r>
+            <a:r>
+              <a:rPr lang="en-GB" dirty="0"/>
+              <a:t>n</a:t>
+            </a:r>
+            <a:r>
+              <a:rPr lang="en-SI" dirty="0"/>
+              <a:t>g it in histogram form – Poisson distribution?</a:t>
+            </a:r>
+          </a:p>
+          <a:p>
+            <a:r>
+              <a:rPr lang="en-SI" dirty="0"/>
+              <a:t>Also trying to calculate the standard distribution from least square method using sum of residuals, effective degrees of freedom and the covariance matrix (?) – PROBLEM: drastic</a:t>
+            </a:r>
+            <a:r>
+              <a:rPr lang="en-GB" dirty="0"/>
+              <a:t>a</a:t>
+            </a:r>
+            <a:r>
+              <a:rPr lang="en-SI" dirty="0" err="1"/>
+              <a:t>lly</a:t>
+            </a:r>
+            <a:r>
+              <a:rPr lang="en-SI" dirty="0"/>
+              <a:t> different to the simulation standard deviation.</a:t>
+            </a:r>
+            <a:endParaRPr lang="sl-SI" dirty="0"/>
+          </a:p>
+        </p:txBody>
+      </p:sp>
+      <p:pic>
+        <p:nvPicPr>
+          <p:cNvPr id="5" name="Slika 4">
+            <a:extLst>
+              <a:ext uri="{FF2B5EF4-FFF2-40B4-BE49-F238E27FC236}">
+                <a16:creationId xmlns:a16="http://schemas.microsoft.com/office/drawing/2014/main" id="{F72E18A0-F49E-775A-10D3-AE8E8AE3DE94}"/>
+              </a:ext>
+            </a:extLst>
+          </p:cNvPr>
+          <p:cNvPicPr>
+            <a:picLocks noChangeAspect="1"/>
+          </p:cNvPicPr>
+          <p:nvPr/>
+        </p:nvPicPr>
+        <p:blipFill>
+          <a:blip r:embed="rId2">
+            <a:extLst>
+              <a:ext uri="{28A0092B-C50C-407E-A947-70E740481C1C}">
+                <a14:useLocalDpi xmlns:a14="http://schemas.microsoft.com/office/drawing/2010/main" val="0"/>
+              </a:ext>
+            </a:extLst>
+          </a:blip>
+          <a:stretch>
+            <a:fillRect/>
+          </a:stretch>
+        </p:blipFill>
+        <p:spPr>
+          <a:xfrm>
+            <a:off x="6433456" y="1690688"/>
+            <a:ext cx="5486400" cy="3657600"/>
+          </a:xfrm>
+          <a:prstGeom prst="rect">
+            <a:avLst/>
+          </a:prstGeom>
+        </p:spPr>
+      </p:pic>
+    </p:spTree>
+    <p:extLst>
+      <p:ext uri="{BB962C8B-B14F-4D97-AF65-F5344CB8AC3E}">
+        <p14:creationId xmlns:p14="http://schemas.microsoft.com/office/powerpoint/2010/main" val="3671714062"/>
       </p:ext>
     </p:extLst>
   </p:cSld>

</xml_diff>

<commit_message>
Work on improved SPS and LM method for location
</commit_message>
<xml_diff>
--- a/reports/work_diary.pptx
+++ b/reports/work_diary.pptx
@@ -14,6 +14,7 @@
     <p:sldId id="262" r:id="rId8"/>
     <p:sldId id="263" r:id="rId9"/>
     <p:sldId id="264" r:id="rId10"/>
+    <p:sldId id="265" r:id="rId11"/>
   </p:sldIdLst>
   <p:sldSz cx="12192000" cy="6858000"/>
   <p:notesSz cx="6858000" cy="9144000"/>
@@ -123,7 +124,7 @@
 <file path=ppt/revisionInfo.xml><?xml version="1.0" encoding="utf-8"?>
 <p1510:revInfo xmlns:a="http://schemas.openxmlformats.org/drawingml/2006/main" xmlns:r="http://schemas.openxmlformats.org/officeDocument/2006/relationships" xmlns:p1510="http://schemas.microsoft.com/office/powerpoint/2015/10/main">
   <p1510:revLst>
-    <p1510:client id="{196519FD-3C64-4461-AC3D-BB99B1B5B961}" v="9" dt="2022-11-14T12:54:06.306"/>
+    <p1510:client id="{196519FD-3C64-4461-AC3D-BB99B1B5B961}" v="10" dt="2022-11-15T14:08:15.579"/>
   </p1510:revLst>
 </p1510:revInfo>
 </file>
@@ -133,7 +134,7 @@
   <pc:docChgLst>
     <pc:chgData name="urh trinko" userId="3b62f928bb6fe22b" providerId="LiveId" clId="{196519FD-3C64-4461-AC3D-BB99B1B5B961}"/>
     <pc:docChg chg="undo custSel addSld delSld modSld">
-      <pc:chgData name="urh trinko" userId="3b62f928bb6fe22b" providerId="LiveId" clId="{196519FD-3C64-4461-AC3D-BB99B1B5B961}" dt="2022-11-14T13:03:14.018" v="4385" actId="1076"/>
+      <pc:chgData name="urh trinko" userId="3b62f928bb6fe22b" providerId="LiveId" clId="{196519FD-3C64-4461-AC3D-BB99B1B5B961}" dt="2022-11-15T14:08:27.804" v="4844" actId="20577"/>
       <pc:docMkLst>
         <pc:docMk/>
       </pc:docMkLst>
@@ -439,6 +440,29 @@
           </ac:picMkLst>
         </pc:picChg>
       </pc:sldChg>
+      <pc:sldChg chg="modSp new mod">
+        <pc:chgData name="urh trinko" userId="3b62f928bb6fe22b" providerId="LiveId" clId="{196519FD-3C64-4461-AC3D-BB99B1B5B961}" dt="2022-11-15T14:08:27.804" v="4844" actId="20577"/>
+        <pc:sldMkLst>
+          <pc:docMk/>
+          <pc:sldMk cId="63427614" sldId="265"/>
+        </pc:sldMkLst>
+        <pc:spChg chg="mod">
+          <ac:chgData name="urh trinko" userId="3b62f928bb6fe22b" providerId="LiveId" clId="{196519FD-3C64-4461-AC3D-BB99B1B5B961}" dt="2022-11-15T14:02:51.403" v="4396" actId="20577"/>
+          <ac:spMkLst>
+            <pc:docMk/>
+            <pc:sldMk cId="63427614" sldId="265"/>
+            <ac:spMk id="2" creationId="{4EF814B4-4432-9D56-7208-E6CCCEBD6619}"/>
+          </ac:spMkLst>
+        </pc:spChg>
+        <pc:spChg chg="mod">
+          <ac:chgData name="urh trinko" userId="3b62f928bb6fe22b" providerId="LiveId" clId="{196519FD-3C64-4461-AC3D-BB99B1B5B961}" dt="2022-11-15T14:08:27.804" v="4844" actId="20577"/>
+          <ac:spMkLst>
+            <pc:docMk/>
+            <pc:sldMk cId="63427614" sldId="265"/>
+            <ac:spMk id="3" creationId="{30C9E2A0-95FE-2E16-413C-FF1BA28691D8}"/>
+          </ac:spMkLst>
+        </pc:spChg>
+      </pc:sldChg>
     </pc:docChg>
   </pc:docChgLst>
 </pc:chgInfo>
@@ -591,7 +615,7 @@
           <a:p>
             <a:fld id="{4C35B1A2-9590-42BA-8C8F-FDB479B04EEB}" type="datetimeFigureOut">
               <a:rPr lang="sl-SI" smtClean="0"/>
-              <a:t>14. 11. 2022</a:t>
+              <a:t>15. 11. 2022</a:t>
             </a:fld>
             <a:endParaRPr lang="sl-SI"/>
           </a:p>
@@ -789,7 +813,7 @@
           <a:p>
             <a:fld id="{4C35B1A2-9590-42BA-8C8F-FDB479B04EEB}" type="datetimeFigureOut">
               <a:rPr lang="sl-SI" smtClean="0"/>
-              <a:t>14. 11. 2022</a:t>
+              <a:t>15. 11. 2022</a:t>
             </a:fld>
             <a:endParaRPr lang="sl-SI"/>
           </a:p>
@@ -997,7 +1021,7 @@
           <a:p>
             <a:fld id="{4C35B1A2-9590-42BA-8C8F-FDB479B04EEB}" type="datetimeFigureOut">
               <a:rPr lang="sl-SI" smtClean="0"/>
-              <a:t>14. 11. 2022</a:t>
+              <a:t>15. 11. 2022</a:t>
             </a:fld>
             <a:endParaRPr lang="sl-SI"/>
           </a:p>
@@ -1195,7 +1219,7 @@
           <a:p>
             <a:fld id="{4C35B1A2-9590-42BA-8C8F-FDB479B04EEB}" type="datetimeFigureOut">
               <a:rPr lang="sl-SI" smtClean="0"/>
-              <a:t>14. 11. 2022</a:t>
+              <a:t>15. 11. 2022</a:t>
             </a:fld>
             <a:endParaRPr lang="sl-SI"/>
           </a:p>
@@ -1470,7 +1494,7 @@
           <a:p>
             <a:fld id="{4C35B1A2-9590-42BA-8C8F-FDB479B04EEB}" type="datetimeFigureOut">
               <a:rPr lang="sl-SI" smtClean="0"/>
-              <a:t>14. 11. 2022</a:t>
+              <a:t>15. 11. 2022</a:t>
             </a:fld>
             <a:endParaRPr lang="sl-SI"/>
           </a:p>
@@ -1735,7 +1759,7 @@
           <a:p>
             <a:fld id="{4C35B1A2-9590-42BA-8C8F-FDB479B04EEB}" type="datetimeFigureOut">
               <a:rPr lang="sl-SI" smtClean="0"/>
-              <a:t>14. 11. 2022</a:t>
+              <a:t>15. 11. 2022</a:t>
             </a:fld>
             <a:endParaRPr lang="sl-SI"/>
           </a:p>
@@ -2147,7 +2171,7 @@
           <a:p>
             <a:fld id="{4C35B1A2-9590-42BA-8C8F-FDB479B04EEB}" type="datetimeFigureOut">
               <a:rPr lang="sl-SI" smtClean="0"/>
-              <a:t>14. 11. 2022</a:t>
+              <a:t>15. 11. 2022</a:t>
             </a:fld>
             <a:endParaRPr lang="sl-SI"/>
           </a:p>
@@ -2288,7 +2312,7 @@
           <a:p>
             <a:fld id="{4C35B1A2-9590-42BA-8C8F-FDB479B04EEB}" type="datetimeFigureOut">
               <a:rPr lang="sl-SI" smtClean="0"/>
-              <a:t>14. 11. 2022</a:t>
+              <a:t>15. 11. 2022</a:t>
             </a:fld>
             <a:endParaRPr lang="sl-SI"/>
           </a:p>
@@ -2401,7 +2425,7 @@
           <a:p>
             <a:fld id="{4C35B1A2-9590-42BA-8C8F-FDB479B04EEB}" type="datetimeFigureOut">
               <a:rPr lang="sl-SI" smtClean="0"/>
-              <a:t>14. 11. 2022</a:t>
+              <a:t>15. 11. 2022</a:t>
             </a:fld>
             <a:endParaRPr lang="sl-SI"/>
           </a:p>
@@ -2712,7 +2736,7 @@
           <a:p>
             <a:fld id="{4C35B1A2-9590-42BA-8C8F-FDB479B04EEB}" type="datetimeFigureOut">
               <a:rPr lang="sl-SI" smtClean="0"/>
-              <a:t>14. 11. 2022</a:t>
+              <a:t>15. 11. 2022</a:t>
             </a:fld>
             <a:endParaRPr lang="sl-SI"/>
           </a:p>
@@ -3000,7 +3024,7 @@
           <a:p>
             <a:fld id="{4C35B1A2-9590-42BA-8C8F-FDB479B04EEB}" type="datetimeFigureOut">
               <a:rPr lang="sl-SI" smtClean="0"/>
-              <a:t>14. 11. 2022</a:t>
+              <a:t>15. 11. 2022</a:t>
             </a:fld>
             <a:endParaRPr lang="sl-SI"/>
           </a:p>
@@ -3241,7 +3265,7 @@
           <a:p>
             <a:fld id="{4C35B1A2-9590-42BA-8C8F-FDB479B04EEB}" type="datetimeFigureOut">
               <a:rPr lang="sl-SI" smtClean="0"/>
-              <a:t>14. 11. 2022</a:t>
+              <a:t>15. 11. 2022</a:t>
             </a:fld>
             <a:endParaRPr lang="sl-SI"/>
           </a:p>
@@ -3720,6 +3744,131 @@
     <p:extLst>
       <p:ext uri="{BB962C8B-B14F-4D97-AF65-F5344CB8AC3E}">
         <p14:creationId xmlns:p14="http://schemas.microsoft.com/office/powerpoint/2010/main" val="422821498"/>
+      </p:ext>
+    </p:extLst>
+  </p:cSld>
+  <p:clrMapOvr>
+    <a:masterClrMapping/>
+  </p:clrMapOvr>
+</p:sld>
+</file>
+
+<file path=ppt/slides/slide10.xml><?xml version="1.0" encoding="utf-8"?>
+<p:sld xmlns:a="http://schemas.openxmlformats.org/drawingml/2006/main" xmlns:r="http://schemas.openxmlformats.org/officeDocument/2006/relationships" xmlns:p="http://schemas.openxmlformats.org/presentationml/2006/main">
+  <p:cSld>
+    <p:spTree>
+      <p:nvGrpSpPr>
+        <p:cNvPr id="1" name=""/>
+        <p:cNvGrpSpPr/>
+        <p:nvPr/>
+      </p:nvGrpSpPr>
+      <p:grpSpPr>
+        <a:xfrm>
+          <a:off x="0" y="0"/>
+          <a:ext cx="0" cy="0"/>
+          <a:chOff x="0" y="0"/>
+          <a:chExt cx="0" cy="0"/>
+        </a:xfrm>
+      </p:grpSpPr>
+      <p:sp>
+        <p:nvSpPr>
+          <p:cNvPr id="2" name="Naslov 1">
+            <a:extLst>
+              <a:ext uri="{FF2B5EF4-FFF2-40B4-BE49-F238E27FC236}">
+                <a16:creationId xmlns:a16="http://schemas.microsoft.com/office/drawing/2014/main" id="{4EF814B4-4432-9D56-7208-E6CCCEBD6619}"/>
+              </a:ext>
+            </a:extLst>
+          </p:cNvPr>
+          <p:cNvSpPr>
+            <a:spLocks noGrp="1"/>
+          </p:cNvSpPr>
+          <p:nvPr>
+            <p:ph type="title"/>
+          </p:nvPr>
+        </p:nvSpPr>
+        <p:spPr/>
+        <p:txBody>
+          <a:bodyPr/>
+          <a:lstStyle/>
+          <a:p>
+            <a:r>
+              <a:rPr lang="en-SI" dirty="0"/>
+              <a:t>15.11.2022</a:t>
+            </a:r>
+            <a:endParaRPr lang="sl-SI" dirty="0"/>
+          </a:p>
+        </p:txBody>
+      </p:sp>
+      <p:sp>
+        <p:nvSpPr>
+          <p:cNvPr id="3" name="Označba mesta vsebine 2">
+            <a:extLst>
+              <a:ext uri="{FF2B5EF4-FFF2-40B4-BE49-F238E27FC236}">
+                <a16:creationId xmlns:a16="http://schemas.microsoft.com/office/drawing/2014/main" id="{30C9E2A0-95FE-2E16-413C-FF1BA28691D8}"/>
+              </a:ext>
+            </a:extLst>
+          </p:cNvPr>
+          <p:cNvSpPr>
+            <a:spLocks noGrp="1"/>
+          </p:cNvSpPr>
+          <p:nvPr>
+            <p:ph idx="1"/>
+          </p:nvPr>
+        </p:nvSpPr>
+        <p:spPr>
+          <a:xfrm>
+            <a:off x="838200" y="1825625"/>
+            <a:ext cx="10515600" cy="3399518"/>
+          </a:xfrm>
+        </p:spPr>
+        <p:txBody>
+          <a:bodyPr/>
+          <a:lstStyle/>
+          <a:p>
+            <a:r>
+              <a:rPr lang="en-SI" dirty="0"/>
+              <a:t>Improving the location code by using </a:t>
+            </a:r>
+            <a:r>
+              <a:rPr lang="en-SI"/>
+              <a:t>the </a:t>
+            </a:r>
+            <a:r>
+              <a:rPr lang="en-SI">
+                <a:hlinkClick r:id="rId2"/>
+              </a:rPr>
+              <a:t>Levenberg-Marquardt</a:t>
+            </a:r>
+            <a:r>
+              <a:rPr lang="en-SI"/>
+              <a:t> (page 707) </a:t>
+            </a:r>
+            <a:r>
+              <a:rPr lang="en-SI" dirty="0"/>
+              <a:t>method for least square </a:t>
+            </a:r>
+            <a:r>
+              <a:rPr lang="en-SI" dirty="0" err="1"/>
+              <a:t>minimazition</a:t>
+            </a:r>
+            <a:r>
+              <a:rPr lang="en-SI" dirty="0"/>
+              <a:t>.</a:t>
+            </a:r>
+          </a:p>
+          <a:p>
+            <a:r>
+              <a:rPr lang="en-SI" dirty="0"/>
+              <a:t>The model function is the inverse square law, where the adjustable parameters are u (x source coordinate), v (y source coordinate) and A0 (the activity of the source). We have a number of data points of intensities along the grid which gives us a overestimated system of equations.</a:t>
+            </a:r>
+            <a:endParaRPr lang="sl-SI" dirty="0"/>
+          </a:p>
+        </p:txBody>
+      </p:sp>
+    </p:spTree>
+    <p:extLst>
+      <p:ext uri="{BB962C8B-B14F-4D97-AF65-F5344CB8AC3E}">
+        <p14:creationId xmlns:p14="http://schemas.microsoft.com/office/powerpoint/2010/main" val="63427614"/>
       </p:ext>
     </p:extLst>
   </p:cSld>

</xml_diff>

<commit_message>
Work on LM method for SPS location
</commit_message>
<xml_diff>
--- a/reports/work_diary.pptx
+++ b/reports/work_diary.pptx
@@ -15,6 +15,7 @@
     <p:sldId id="263" r:id="rId9"/>
     <p:sldId id="264" r:id="rId10"/>
     <p:sldId id="265" r:id="rId11"/>
+    <p:sldId id="266" r:id="rId12"/>
   </p:sldIdLst>
   <p:sldSz cx="12192000" cy="6858000"/>
   <p:notesSz cx="6858000" cy="9144000"/>
@@ -124,7 +125,7 @@
 <file path=ppt/revisionInfo.xml><?xml version="1.0" encoding="utf-8"?>
 <p1510:revInfo xmlns:a="http://schemas.openxmlformats.org/drawingml/2006/main" xmlns:r="http://schemas.openxmlformats.org/officeDocument/2006/relationships" xmlns:p1510="http://schemas.microsoft.com/office/powerpoint/2015/10/main">
   <p1510:revLst>
-    <p1510:client id="{196519FD-3C64-4461-AC3D-BB99B1B5B961}" v="10" dt="2022-11-15T14:08:15.579"/>
+    <p1510:client id="{196519FD-3C64-4461-AC3D-BB99B1B5B961}" v="12" dt="2022-11-16T13:49:08.899"/>
   </p1510:revLst>
 </p1510:revInfo>
 </file>
@@ -134,7 +135,7 @@
   <pc:docChgLst>
     <pc:chgData name="urh trinko" userId="3b62f928bb6fe22b" providerId="LiveId" clId="{196519FD-3C64-4461-AC3D-BB99B1B5B961}"/>
     <pc:docChg chg="undo custSel addSld delSld modSld">
-      <pc:chgData name="urh trinko" userId="3b62f928bb6fe22b" providerId="LiveId" clId="{196519FD-3C64-4461-AC3D-BB99B1B5B961}" dt="2022-11-15T14:08:27.804" v="4844" actId="20577"/>
+      <pc:chgData name="urh trinko" userId="3b62f928bb6fe22b" providerId="LiveId" clId="{196519FD-3C64-4461-AC3D-BB99B1B5B961}" dt="2022-11-16T13:49:15.757" v="5070" actId="1076"/>
       <pc:docMkLst>
         <pc:docMk/>
       </pc:docMkLst>
@@ -463,6 +464,45 @@
           </ac:spMkLst>
         </pc:spChg>
       </pc:sldChg>
+      <pc:sldChg chg="addSp modSp new mod">
+        <pc:chgData name="urh trinko" userId="3b62f928bb6fe22b" providerId="LiveId" clId="{196519FD-3C64-4461-AC3D-BB99B1B5B961}" dt="2022-11-16T13:49:15.757" v="5070" actId="1076"/>
+        <pc:sldMkLst>
+          <pc:docMk/>
+          <pc:sldMk cId="3368438331" sldId="266"/>
+        </pc:sldMkLst>
+        <pc:spChg chg="mod">
+          <ac:chgData name="urh trinko" userId="3b62f928bb6fe22b" providerId="LiveId" clId="{196519FD-3C64-4461-AC3D-BB99B1B5B961}" dt="2022-11-16T13:43:21.907" v="4857" actId="20577"/>
+          <ac:spMkLst>
+            <pc:docMk/>
+            <pc:sldMk cId="3368438331" sldId="266"/>
+            <ac:spMk id="2" creationId="{D1CD0D1D-7412-67A7-4CDA-F5A44E8E1F3C}"/>
+          </ac:spMkLst>
+        </pc:spChg>
+        <pc:spChg chg="mod">
+          <ac:chgData name="urh trinko" userId="3b62f928bb6fe22b" providerId="LiveId" clId="{196519FD-3C64-4461-AC3D-BB99B1B5B961}" dt="2022-11-16T13:48:38.172" v="5064" actId="1076"/>
+          <ac:spMkLst>
+            <pc:docMk/>
+            <pc:sldMk cId="3368438331" sldId="266"/>
+            <ac:spMk id="3" creationId="{8D09B32D-FDA4-B56B-1C4F-BD9B7883C2C7}"/>
+          </ac:spMkLst>
+        </pc:spChg>
+        <pc:picChg chg="add mod">
+          <ac:chgData name="urh trinko" userId="3b62f928bb6fe22b" providerId="LiveId" clId="{196519FD-3C64-4461-AC3D-BB99B1B5B961}" dt="2022-11-16T13:48:58.454" v="5066" actId="1076"/>
+          <ac:picMkLst>
+            <pc:docMk/>
+            <pc:sldMk cId="3368438331" sldId="266"/>
+            <ac:picMk id="5" creationId="{BA21B572-A406-2AD4-870A-A5EAB7E1F148}"/>
+          </ac:picMkLst>
+        </pc:picChg>
+        <pc:picChg chg="add mod">
+          <ac:chgData name="urh trinko" userId="3b62f928bb6fe22b" providerId="LiveId" clId="{196519FD-3C64-4461-AC3D-BB99B1B5B961}" dt="2022-11-16T13:49:15.757" v="5070" actId="1076"/>
+          <ac:picMkLst>
+            <pc:docMk/>
+            <pc:sldMk cId="3368438331" sldId="266"/>
+            <ac:picMk id="7" creationId="{29958D45-0E4C-56A5-0F83-A4D51EFD4958}"/>
+          </ac:picMkLst>
+        </pc:picChg>
+      </pc:sldChg>
     </pc:docChg>
   </pc:docChgLst>
 </pc:chgInfo>
@@ -615,7 +655,7 @@
           <a:p>
             <a:fld id="{4C35B1A2-9590-42BA-8C8F-FDB479B04EEB}" type="datetimeFigureOut">
               <a:rPr lang="sl-SI" smtClean="0"/>
-              <a:t>15. 11. 2022</a:t>
+              <a:t>16. 11. 2022</a:t>
             </a:fld>
             <a:endParaRPr lang="sl-SI"/>
           </a:p>
@@ -813,7 +853,7 @@
           <a:p>
             <a:fld id="{4C35B1A2-9590-42BA-8C8F-FDB479B04EEB}" type="datetimeFigureOut">
               <a:rPr lang="sl-SI" smtClean="0"/>
-              <a:t>15. 11. 2022</a:t>
+              <a:t>16. 11. 2022</a:t>
             </a:fld>
             <a:endParaRPr lang="sl-SI"/>
           </a:p>
@@ -1021,7 +1061,7 @@
           <a:p>
             <a:fld id="{4C35B1A2-9590-42BA-8C8F-FDB479B04EEB}" type="datetimeFigureOut">
               <a:rPr lang="sl-SI" smtClean="0"/>
-              <a:t>15. 11. 2022</a:t>
+              <a:t>16. 11. 2022</a:t>
             </a:fld>
             <a:endParaRPr lang="sl-SI"/>
           </a:p>
@@ -1219,7 +1259,7 @@
           <a:p>
             <a:fld id="{4C35B1A2-9590-42BA-8C8F-FDB479B04EEB}" type="datetimeFigureOut">
               <a:rPr lang="sl-SI" smtClean="0"/>
-              <a:t>15. 11. 2022</a:t>
+              <a:t>16. 11. 2022</a:t>
             </a:fld>
             <a:endParaRPr lang="sl-SI"/>
           </a:p>
@@ -1494,7 +1534,7 @@
           <a:p>
             <a:fld id="{4C35B1A2-9590-42BA-8C8F-FDB479B04EEB}" type="datetimeFigureOut">
               <a:rPr lang="sl-SI" smtClean="0"/>
-              <a:t>15. 11. 2022</a:t>
+              <a:t>16. 11. 2022</a:t>
             </a:fld>
             <a:endParaRPr lang="sl-SI"/>
           </a:p>
@@ -1759,7 +1799,7 @@
           <a:p>
             <a:fld id="{4C35B1A2-9590-42BA-8C8F-FDB479B04EEB}" type="datetimeFigureOut">
               <a:rPr lang="sl-SI" smtClean="0"/>
-              <a:t>15. 11. 2022</a:t>
+              <a:t>16. 11. 2022</a:t>
             </a:fld>
             <a:endParaRPr lang="sl-SI"/>
           </a:p>
@@ -2171,7 +2211,7 @@
           <a:p>
             <a:fld id="{4C35B1A2-9590-42BA-8C8F-FDB479B04EEB}" type="datetimeFigureOut">
               <a:rPr lang="sl-SI" smtClean="0"/>
-              <a:t>15. 11. 2022</a:t>
+              <a:t>16. 11. 2022</a:t>
             </a:fld>
             <a:endParaRPr lang="sl-SI"/>
           </a:p>
@@ -2312,7 +2352,7 @@
           <a:p>
             <a:fld id="{4C35B1A2-9590-42BA-8C8F-FDB479B04EEB}" type="datetimeFigureOut">
               <a:rPr lang="sl-SI" smtClean="0"/>
-              <a:t>15. 11. 2022</a:t>
+              <a:t>16. 11. 2022</a:t>
             </a:fld>
             <a:endParaRPr lang="sl-SI"/>
           </a:p>
@@ -2425,7 +2465,7 @@
           <a:p>
             <a:fld id="{4C35B1A2-9590-42BA-8C8F-FDB479B04EEB}" type="datetimeFigureOut">
               <a:rPr lang="sl-SI" smtClean="0"/>
-              <a:t>15. 11. 2022</a:t>
+              <a:t>16. 11. 2022</a:t>
             </a:fld>
             <a:endParaRPr lang="sl-SI"/>
           </a:p>
@@ -2736,7 +2776,7 @@
           <a:p>
             <a:fld id="{4C35B1A2-9590-42BA-8C8F-FDB479B04EEB}" type="datetimeFigureOut">
               <a:rPr lang="sl-SI" smtClean="0"/>
-              <a:t>15. 11. 2022</a:t>
+              <a:t>16. 11. 2022</a:t>
             </a:fld>
             <a:endParaRPr lang="sl-SI"/>
           </a:p>
@@ -3024,7 +3064,7 @@
           <a:p>
             <a:fld id="{4C35B1A2-9590-42BA-8C8F-FDB479B04EEB}" type="datetimeFigureOut">
               <a:rPr lang="sl-SI" smtClean="0"/>
-              <a:t>15. 11. 2022</a:t>
+              <a:t>16. 11. 2022</a:t>
             </a:fld>
             <a:endParaRPr lang="sl-SI"/>
           </a:p>
@@ -3265,7 +3305,7 @@
           <a:p>
             <a:fld id="{4C35B1A2-9590-42BA-8C8F-FDB479B04EEB}" type="datetimeFigureOut">
               <a:rPr lang="sl-SI" smtClean="0"/>
-              <a:t>15. 11. 2022</a:t>
+              <a:t>16. 11. 2022</a:t>
             </a:fld>
             <a:endParaRPr lang="sl-SI"/>
           </a:p>
@@ -3869,6 +3909,184 @@
     <p:extLst>
       <p:ext uri="{BB962C8B-B14F-4D97-AF65-F5344CB8AC3E}">
         <p14:creationId xmlns:p14="http://schemas.microsoft.com/office/powerpoint/2010/main" val="63427614"/>
+      </p:ext>
+    </p:extLst>
+  </p:cSld>
+  <p:clrMapOvr>
+    <a:masterClrMapping/>
+  </p:clrMapOvr>
+</p:sld>
+</file>
+
+<file path=ppt/slides/slide11.xml><?xml version="1.0" encoding="utf-8"?>
+<p:sld xmlns:a="http://schemas.openxmlformats.org/drawingml/2006/main" xmlns:r="http://schemas.openxmlformats.org/officeDocument/2006/relationships" xmlns:p="http://schemas.openxmlformats.org/presentationml/2006/main">
+  <p:cSld>
+    <p:spTree>
+      <p:nvGrpSpPr>
+        <p:cNvPr id="1" name=""/>
+        <p:cNvGrpSpPr/>
+        <p:nvPr/>
+      </p:nvGrpSpPr>
+      <p:grpSpPr>
+        <a:xfrm>
+          <a:off x="0" y="0"/>
+          <a:ext cx="0" cy="0"/>
+          <a:chOff x="0" y="0"/>
+          <a:chExt cx="0" cy="0"/>
+        </a:xfrm>
+      </p:grpSpPr>
+      <p:sp>
+        <p:nvSpPr>
+          <p:cNvPr id="2" name="Naslov 1">
+            <a:extLst>
+              <a:ext uri="{FF2B5EF4-FFF2-40B4-BE49-F238E27FC236}">
+                <a16:creationId xmlns:a16="http://schemas.microsoft.com/office/drawing/2014/main" id="{D1CD0D1D-7412-67A7-4CDA-F5A44E8E1F3C}"/>
+              </a:ext>
+            </a:extLst>
+          </p:cNvPr>
+          <p:cNvSpPr>
+            <a:spLocks noGrp="1"/>
+          </p:cNvSpPr>
+          <p:nvPr>
+            <p:ph type="title"/>
+          </p:nvPr>
+        </p:nvSpPr>
+        <p:spPr/>
+        <p:txBody>
+          <a:bodyPr/>
+          <a:lstStyle/>
+          <a:p>
+            <a:r>
+              <a:rPr lang="en-SI" dirty="0"/>
+              <a:t>16.11.2022</a:t>
+            </a:r>
+            <a:endParaRPr lang="sl-SI" dirty="0"/>
+          </a:p>
+        </p:txBody>
+      </p:sp>
+      <p:sp>
+        <p:nvSpPr>
+          <p:cNvPr id="3" name="Označba mesta vsebine 2">
+            <a:extLst>
+              <a:ext uri="{FF2B5EF4-FFF2-40B4-BE49-F238E27FC236}">
+                <a16:creationId xmlns:a16="http://schemas.microsoft.com/office/drawing/2014/main" id="{8D09B32D-FDA4-B56B-1C4F-BD9B7883C2C7}"/>
+              </a:ext>
+            </a:extLst>
+          </p:cNvPr>
+          <p:cNvSpPr>
+            <a:spLocks noGrp="1"/>
+          </p:cNvSpPr>
+          <p:nvPr>
+            <p:ph idx="1"/>
+          </p:nvPr>
+        </p:nvSpPr>
+        <p:spPr>
+          <a:xfrm>
+            <a:off x="838200" y="1531710"/>
+            <a:ext cx="10515600" cy="1418318"/>
+          </a:xfrm>
+        </p:spPr>
+        <p:txBody>
+          <a:bodyPr/>
+          <a:lstStyle/>
+          <a:p>
+            <a:r>
+              <a:rPr lang="en-SI" dirty="0"/>
+              <a:t>Successful in making the source locating code using the LM method in </a:t>
+            </a:r>
+            <a:r>
+              <a:rPr lang="en-SI" dirty="0" err="1"/>
+              <a:t>scipy</a:t>
+            </a:r>
+            <a:r>
+              <a:rPr lang="en-SI" dirty="0"/>
+              <a:t>. As we can se the accuracy is much higher then with the previous attempts.</a:t>
+            </a:r>
+          </a:p>
+          <a:p>
+            <a:pPr marL="0" indent="0">
+              <a:buNone/>
+            </a:pPr>
+            <a:endParaRPr lang="sl-SI" dirty="0"/>
+          </a:p>
+        </p:txBody>
+      </p:sp>
+      <p:pic>
+        <p:nvPicPr>
+          <p:cNvPr id="5" name="Slika 4">
+            <a:extLst>
+              <a:ext uri="{FF2B5EF4-FFF2-40B4-BE49-F238E27FC236}">
+                <a16:creationId xmlns:a16="http://schemas.microsoft.com/office/drawing/2014/main" id="{BA21B572-A406-2AD4-870A-A5EAB7E1F148}"/>
+              </a:ext>
+            </a:extLst>
+          </p:cNvPr>
+          <p:cNvPicPr>
+            <a:picLocks noChangeAspect="1"/>
+          </p:cNvPicPr>
+          <p:nvPr/>
+        </p:nvPicPr>
+        <p:blipFill>
+          <a:blip r:embed="rId2">
+            <a:extLst>
+              <a:ext uri="{28A0092B-C50C-407E-A947-70E740481C1C}">
+                <a14:useLocalDpi xmlns:a14="http://schemas.microsoft.com/office/drawing/2010/main" val="0"/>
+              </a:ext>
+            </a:extLst>
+          </a:blip>
+          <a:stretch>
+            <a:fillRect/>
+          </a:stretch>
+        </p:blipFill>
+        <p:spPr>
+          <a:xfrm>
+            <a:off x="7315200" y="3347357"/>
+            <a:ext cx="4038600" cy="2667000"/>
+          </a:xfrm>
+          <a:prstGeom prst="rect">
+            <a:avLst/>
+          </a:prstGeom>
+        </p:spPr>
+      </p:pic>
+      <p:pic>
+        <p:nvPicPr>
+          <p:cNvPr id="7" name="Slika 6">
+            <a:extLst>
+              <a:ext uri="{FF2B5EF4-FFF2-40B4-BE49-F238E27FC236}">
+                <a16:creationId xmlns:a16="http://schemas.microsoft.com/office/drawing/2014/main" id="{29958D45-0E4C-56A5-0F83-A4D51EFD4958}"/>
+              </a:ext>
+            </a:extLst>
+          </p:cNvPr>
+          <p:cNvPicPr>
+            <a:picLocks noChangeAspect="1"/>
+          </p:cNvPicPr>
+          <p:nvPr/>
+        </p:nvPicPr>
+        <p:blipFill>
+          <a:blip r:embed="rId3">
+            <a:extLst>
+              <a:ext uri="{28A0092B-C50C-407E-A947-70E740481C1C}">
+                <a14:useLocalDpi xmlns:a14="http://schemas.microsoft.com/office/drawing/2010/main" val="0"/>
+              </a:ext>
+            </a:extLst>
+          </a:blip>
+          <a:stretch>
+            <a:fillRect/>
+          </a:stretch>
+        </p:blipFill>
+        <p:spPr>
+          <a:xfrm>
+            <a:off x="285751" y="3070679"/>
+            <a:ext cx="6844392" cy="3422196"/>
+          </a:xfrm>
+          <a:prstGeom prst="rect">
+            <a:avLst/>
+          </a:prstGeom>
+        </p:spPr>
+      </p:pic>
+    </p:spTree>
+    <p:extLst>
+      <p:ext uri="{BB962C8B-B14F-4D97-AF65-F5344CB8AC3E}">
+        <p14:creationId xmlns:p14="http://schemas.microsoft.com/office/powerpoint/2010/main" val="3368438331"/>
       </p:ext>
     </p:extLst>
   </p:cSld>

</xml_diff>

<commit_message>
Work on simulation GUI
</commit_message>
<xml_diff>
--- a/reports/work_diary.pptx
+++ b/reports/work_diary.pptx
@@ -67,6 +67,7 @@
     <p:sldId id="315" r:id="rId61"/>
     <p:sldId id="316" r:id="rId62"/>
     <p:sldId id="317" r:id="rId63"/>
+    <p:sldId id="318" r:id="rId64"/>
   </p:sldIdLst>
   <p:sldSz cx="12192000" cy="6858000"/>
   <p:notesSz cx="6858000" cy="9144000"/>
@@ -232,6 +233,7 @@
             <p14:sldId id="315"/>
             <p14:sldId id="316"/>
             <p14:sldId id="317"/>
+            <p14:sldId id="318"/>
           </p14:sldIdLst>
         </p14:section>
       </p14:sectionLst>
@@ -256,7 +258,7 @@
   <pc:docChgLst>
     <pc:chgData name="urh trinko" userId="3b62f928bb6fe22b" providerId="LiveId" clId="{196519FD-3C64-4461-AC3D-BB99B1B5B961}"/>
     <pc:docChg chg="undo custSel addSld delSld modSld addSection delSection modSection">
-      <pc:chgData name="urh trinko" userId="3b62f928bb6fe22b" providerId="LiveId" clId="{196519FD-3C64-4461-AC3D-BB99B1B5B961}" dt="2023-01-27T11:52:23.434" v="33507" actId="5793"/>
+      <pc:chgData name="urh trinko" userId="3b62f928bb6fe22b" providerId="LiveId" clId="{196519FD-3C64-4461-AC3D-BB99B1B5B961}" dt="2023-01-30T13:55:35.347" v="33911" actId="20577"/>
       <pc:docMkLst>
         <pc:docMk/>
       </pc:docMkLst>
@@ -2273,6 +2275,29 @@
             <pc:docMk/>
             <pc:sldMk cId="402201125" sldId="317"/>
             <ac:spMk id="3" creationId="{1C046798-9DFD-7146-DD0E-38911C5B25CB}"/>
+          </ac:spMkLst>
+        </pc:spChg>
+      </pc:sldChg>
+      <pc:sldChg chg="modSp new mod">
+        <pc:chgData name="urh trinko" userId="3b62f928bb6fe22b" providerId="LiveId" clId="{196519FD-3C64-4461-AC3D-BB99B1B5B961}" dt="2023-01-30T13:55:35.347" v="33911" actId="20577"/>
+        <pc:sldMkLst>
+          <pc:docMk/>
+          <pc:sldMk cId="2755848481" sldId="318"/>
+        </pc:sldMkLst>
+        <pc:spChg chg="mod">
+          <ac:chgData name="urh trinko" userId="3b62f928bb6fe22b" providerId="LiveId" clId="{196519FD-3C64-4461-AC3D-BB99B1B5B961}" dt="2023-01-30T13:36:56.927" v="33517" actId="20577"/>
+          <ac:spMkLst>
+            <pc:docMk/>
+            <pc:sldMk cId="2755848481" sldId="318"/>
+            <ac:spMk id="2" creationId="{5CE28DA6-2FB3-0CB1-478C-6C7B9A2F55D6}"/>
+          </ac:spMkLst>
+        </pc:spChg>
+        <pc:spChg chg="mod">
+          <ac:chgData name="urh trinko" userId="3b62f928bb6fe22b" providerId="LiveId" clId="{196519FD-3C64-4461-AC3D-BB99B1B5B961}" dt="2023-01-30T13:55:35.347" v="33911" actId="20577"/>
+          <ac:spMkLst>
+            <pc:docMk/>
+            <pc:sldMk cId="2755848481" sldId="318"/>
+            <ac:spMk id="3" creationId="{356396D0-578A-0C82-7A09-B8D9B33226C9}"/>
           </ac:spMkLst>
         </pc:spChg>
       </pc:sldChg>
@@ -2428,7 +2453,7 @@
           <a:p>
             <a:fld id="{4C35B1A2-9590-42BA-8C8F-FDB479B04EEB}" type="datetimeFigureOut">
               <a:rPr lang="sl-SI" smtClean="0"/>
-              <a:t>27. 01. 2023</a:t>
+              <a:t>30. 01. 2023</a:t>
             </a:fld>
             <a:endParaRPr lang="sl-SI"/>
           </a:p>
@@ -2626,7 +2651,7 @@
           <a:p>
             <a:fld id="{4C35B1A2-9590-42BA-8C8F-FDB479B04EEB}" type="datetimeFigureOut">
               <a:rPr lang="sl-SI" smtClean="0"/>
-              <a:t>27. 01. 2023</a:t>
+              <a:t>30. 01. 2023</a:t>
             </a:fld>
             <a:endParaRPr lang="sl-SI"/>
           </a:p>
@@ -2834,7 +2859,7 @@
           <a:p>
             <a:fld id="{4C35B1A2-9590-42BA-8C8F-FDB479B04EEB}" type="datetimeFigureOut">
               <a:rPr lang="sl-SI" smtClean="0"/>
-              <a:t>27. 01. 2023</a:t>
+              <a:t>30. 01. 2023</a:t>
             </a:fld>
             <a:endParaRPr lang="sl-SI"/>
           </a:p>
@@ -3032,7 +3057,7 @@
           <a:p>
             <a:fld id="{4C35B1A2-9590-42BA-8C8F-FDB479B04EEB}" type="datetimeFigureOut">
               <a:rPr lang="sl-SI" smtClean="0"/>
-              <a:t>27. 01. 2023</a:t>
+              <a:t>30. 01. 2023</a:t>
             </a:fld>
             <a:endParaRPr lang="sl-SI"/>
           </a:p>
@@ -3307,7 +3332,7 @@
           <a:p>
             <a:fld id="{4C35B1A2-9590-42BA-8C8F-FDB479B04EEB}" type="datetimeFigureOut">
               <a:rPr lang="sl-SI" smtClean="0"/>
-              <a:t>27. 01. 2023</a:t>
+              <a:t>30. 01. 2023</a:t>
             </a:fld>
             <a:endParaRPr lang="sl-SI"/>
           </a:p>
@@ -3572,7 +3597,7 @@
           <a:p>
             <a:fld id="{4C35B1A2-9590-42BA-8C8F-FDB479B04EEB}" type="datetimeFigureOut">
               <a:rPr lang="sl-SI" smtClean="0"/>
-              <a:t>27. 01. 2023</a:t>
+              <a:t>30. 01. 2023</a:t>
             </a:fld>
             <a:endParaRPr lang="sl-SI"/>
           </a:p>
@@ -3984,7 +4009,7 @@
           <a:p>
             <a:fld id="{4C35B1A2-9590-42BA-8C8F-FDB479B04EEB}" type="datetimeFigureOut">
               <a:rPr lang="sl-SI" smtClean="0"/>
-              <a:t>27. 01. 2023</a:t>
+              <a:t>30. 01. 2023</a:t>
             </a:fld>
             <a:endParaRPr lang="sl-SI"/>
           </a:p>
@@ -4125,7 +4150,7 @@
           <a:p>
             <a:fld id="{4C35B1A2-9590-42BA-8C8F-FDB479B04EEB}" type="datetimeFigureOut">
               <a:rPr lang="sl-SI" smtClean="0"/>
-              <a:t>27. 01. 2023</a:t>
+              <a:t>30. 01. 2023</a:t>
             </a:fld>
             <a:endParaRPr lang="sl-SI"/>
           </a:p>
@@ -4238,7 +4263,7 @@
           <a:p>
             <a:fld id="{4C35B1A2-9590-42BA-8C8F-FDB479B04EEB}" type="datetimeFigureOut">
               <a:rPr lang="sl-SI" smtClean="0"/>
-              <a:t>27. 01. 2023</a:t>
+              <a:t>30. 01. 2023</a:t>
             </a:fld>
             <a:endParaRPr lang="sl-SI"/>
           </a:p>
@@ -4549,7 +4574,7 @@
           <a:p>
             <a:fld id="{4C35B1A2-9590-42BA-8C8F-FDB479B04EEB}" type="datetimeFigureOut">
               <a:rPr lang="sl-SI" smtClean="0"/>
-              <a:t>27. 01. 2023</a:t>
+              <a:t>30. 01. 2023</a:t>
             </a:fld>
             <a:endParaRPr lang="sl-SI"/>
           </a:p>
@@ -4837,7 +4862,7 @@
           <a:p>
             <a:fld id="{4C35B1A2-9590-42BA-8C8F-FDB479B04EEB}" type="datetimeFigureOut">
               <a:rPr lang="sl-SI" smtClean="0"/>
-              <a:t>27. 01. 2023</a:t>
+              <a:t>30. 01. 2023</a:t>
             </a:fld>
             <a:endParaRPr lang="sl-SI"/>
           </a:p>
@@ -5078,7 +5103,7 @@
           <a:p>
             <a:fld id="{4C35B1A2-9590-42BA-8C8F-FDB479B04EEB}" type="datetimeFigureOut">
               <a:rPr lang="sl-SI" smtClean="0"/>
-              <a:t>27. 01. 2023</a:t>
+              <a:t>30. 01. 2023</a:t>
             </a:fld>
             <a:endParaRPr lang="sl-SI"/>
           </a:p>
@@ -14462,6 +14487,153 @@
     <p:extLst>
       <p:ext uri="{BB962C8B-B14F-4D97-AF65-F5344CB8AC3E}">
         <p14:creationId xmlns:p14="http://schemas.microsoft.com/office/powerpoint/2010/main" val="402201125"/>
+      </p:ext>
+    </p:extLst>
+  </p:cSld>
+  <p:clrMapOvr>
+    <a:masterClrMapping/>
+  </p:clrMapOvr>
+</p:sld>
+</file>
+
+<file path=ppt/slides/slide63.xml><?xml version="1.0" encoding="utf-8"?>
+<p:sld xmlns:a="http://schemas.openxmlformats.org/drawingml/2006/main" xmlns:r="http://schemas.openxmlformats.org/officeDocument/2006/relationships" xmlns:p="http://schemas.openxmlformats.org/presentationml/2006/main">
+  <p:cSld>
+    <p:spTree>
+      <p:nvGrpSpPr>
+        <p:cNvPr id="1" name=""/>
+        <p:cNvGrpSpPr/>
+        <p:nvPr/>
+      </p:nvGrpSpPr>
+      <p:grpSpPr>
+        <a:xfrm>
+          <a:off x="0" y="0"/>
+          <a:ext cx="0" cy="0"/>
+          <a:chOff x="0" y="0"/>
+          <a:chExt cx="0" cy="0"/>
+        </a:xfrm>
+      </p:grpSpPr>
+      <p:sp>
+        <p:nvSpPr>
+          <p:cNvPr id="2" name="Naslov 1">
+            <a:extLst>
+              <a:ext uri="{FF2B5EF4-FFF2-40B4-BE49-F238E27FC236}">
+                <a16:creationId xmlns:a16="http://schemas.microsoft.com/office/drawing/2014/main" id="{5CE28DA6-2FB3-0CB1-478C-6C7B9A2F55D6}"/>
+              </a:ext>
+            </a:extLst>
+          </p:cNvPr>
+          <p:cNvSpPr>
+            <a:spLocks noGrp="1"/>
+          </p:cNvSpPr>
+          <p:nvPr>
+            <p:ph type="title"/>
+          </p:nvPr>
+        </p:nvSpPr>
+        <p:spPr/>
+        <p:txBody>
+          <a:bodyPr/>
+          <a:lstStyle/>
+          <a:p>
+            <a:r>
+              <a:rPr lang="en-SI" dirty="0"/>
+              <a:t>30.1.2023</a:t>
+            </a:r>
+            <a:endParaRPr lang="sl-SI" dirty="0"/>
+          </a:p>
+        </p:txBody>
+      </p:sp>
+      <p:sp>
+        <p:nvSpPr>
+          <p:cNvPr id="3" name="Označba mesta vsebine 2">
+            <a:extLst>
+              <a:ext uri="{FF2B5EF4-FFF2-40B4-BE49-F238E27FC236}">
+                <a16:creationId xmlns:a16="http://schemas.microsoft.com/office/drawing/2014/main" id="{356396D0-578A-0C82-7A09-B8D9B33226C9}"/>
+              </a:ext>
+            </a:extLst>
+          </p:cNvPr>
+          <p:cNvSpPr>
+            <a:spLocks noGrp="1"/>
+          </p:cNvSpPr>
+          <p:nvPr>
+            <p:ph idx="1"/>
+          </p:nvPr>
+        </p:nvSpPr>
+        <p:spPr/>
+        <p:txBody>
+          <a:bodyPr/>
+          <a:lstStyle/>
+          <a:p>
+            <a:r>
+              <a:rPr lang="en-SI" dirty="0"/>
+              <a:t>Fixed the code is</a:t>
+            </a:r>
+            <a:r>
+              <a:rPr lang="en-GB" dirty="0"/>
+              <a:t>s</a:t>
+            </a:r>
+            <a:r>
+              <a:rPr lang="en-SI" dirty="0" err="1"/>
+              <a:t>ue</a:t>
+            </a:r>
+            <a:r>
+              <a:rPr lang="en-SI" dirty="0"/>
+              <a:t> where the estimated source activity for ZIG-ZAG </a:t>
+            </a:r>
+            <a:r>
+              <a:rPr lang="en-GB" dirty="0"/>
+              <a:t>an</a:t>
+            </a:r>
+            <a:r>
+              <a:rPr lang="en-SI" dirty="0"/>
+              <a:t>d ZIG-ZAG+RANDOM were completely wrong.</a:t>
+            </a:r>
+          </a:p>
+          <a:p>
+            <a:r>
+              <a:rPr lang="en-SI" dirty="0"/>
+              <a:t>Adding more umph to the GUI.</a:t>
+            </a:r>
+          </a:p>
+          <a:p>
+            <a:r>
+              <a:rPr lang="en-SI" dirty="0"/>
+              <a:t>In future add something to prevent the error when converting string to float, maybe use some kind of </a:t>
+            </a:r>
+            <a:r>
+              <a:rPr lang="en-SI" dirty="0" err="1"/>
+              <a:t>i</a:t>
+            </a:r>
+            <a:r>
+              <a:rPr lang="en-GB" dirty="0"/>
+              <a:t>m</a:t>
+            </a:r>
+            <a:r>
+              <a:rPr lang="en-SI" dirty="0" err="1"/>
+              <a:t>plemented</a:t>
+            </a:r>
+            <a:r>
+              <a:rPr lang="en-SI" dirty="0"/>
+              <a:t> function that sets float and not text. Add a det</a:t>
+            </a:r>
+            <a:r>
+              <a:rPr lang="en-GB" dirty="0"/>
+              <a:t>a</a:t>
+            </a:r>
+            <a:r>
+              <a:rPr lang="en-SI" dirty="0" err="1"/>
+              <a:t>iled</a:t>
+            </a:r>
+            <a:r>
+              <a:rPr lang="en-SI"/>
+              <a:t> description.</a:t>
+            </a:r>
+          </a:p>
+        </p:txBody>
+      </p:sp>
+    </p:spTree>
+    <p:extLst>
+      <p:ext uri="{BB962C8B-B14F-4D97-AF65-F5344CB8AC3E}">
+        <p14:creationId xmlns:p14="http://schemas.microsoft.com/office/powerpoint/2010/main" val="2755848481"/>
       </p:ext>
     </p:extLst>
   </p:cSld>

</xml_diff>

<commit_message>
GUI for detector simulation
</commit_message>
<xml_diff>
--- a/reports/work_diary.pptx
+++ b/reports/work_diary.pptx
@@ -71,6 +71,7 @@
     <p:sldId id="319" r:id="rId65"/>
     <p:sldId id="320" r:id="rId66"/>
     <p:sldId id="321" r:id="rId67"/>
+    <p:sldId id="322" r:id="rId68"/>
   </p:sldIdLst>
   <p:sldSz cx="12192000" cy="6858000"/>
   <p:notesSz cx="6858000" cy="9144000"/>
@@ -240,6 +241,7 @@
             <p14:sldId id="319"/>
             <p14:sldId id="320"/>
             <p14:sldId id="321"/>
+            <p14:sldId id="322"/>
           </p14:sldIdLst>
         </p14:section>
       </p14:sectionLst>
@@ -254,7 +256,7 @@
 <file path=ppt/revisionInfo.xml><?xml version="1.0" encoding="utf-8"?>
 <p1510:revInfo xmlns:a="http://schemas.openxmlformats.org/drawingml/2006/main" xmlns:r="http://schemas.openxmlformats.org/officeDocument/2006/relationships" xmlns:p1510="http://schemas.microsoft.com/office/powerpoint/2015/10/main">
   <p1510:revLst>
-    <p1510:client id="{196519FD-3C64-4461-AC3D-BB99B1B5B961}" v="79" dt="2023-02-01T11:11:27.177"/>
+    <p1510:client id="{196519FD-3C64-4461-AC3D-BB99B1B5B961}" v="80" dt="2023-02-03T16:06:26.777"/>
   </p1510:revLst>
 </p1510:revInfo>
 </file>
@@ -264,7 +266,7 @@
   <pc:docChgLst>
     <pc:chgData name="urh trinko" userId="3b62f928bb6fe22b" providerId="LiveId" clId="{196519FD-3C64-4461-AC3D-BB99B1B5B961}"/>
     <pc:docChg chg="undo custSel addSld delSld modSld addSection delSection modSection">
-      <pc:chgData name="urh trinko" userId="3b62f928bb6fe22b" providerId="LiveId" clId="{196519FD-3C64-4461-AC3D-BB99B1B5B961}" dt="2023-02-01T11:13:22.758" v="34702" actId="1076"/>
+      <pc:chgData name="urh trinko" userId="3b62f928bb6fe22b" providerId="LiveId" clId="{196519FD-3C64-4461-AC3D-BB99B1B5B961}" dt="2023-02-03T16:06:32.735" v="34811" actId="1076"/>
       <pc:docMkLst>
         <pc:docMk/>
       </pc:docMkLst>
@@ -2397,6 +2399,37 @@
             <pc:docMk/>
             <pc:sldMk cId="4279281272" sldId="321"/>
             <ac:picMk id="9" creationId="{6B74C733-76B5-7A31-2F22-18659F64ACC2}"/>
+          </ac:picMkLst>
+        </pc:picChg>
+      </pc:sldChg>
+      <pc:sldChg chg="addSp modSp new mod">
+        <pc:chgData name="urh trinko" userId="3b62f928bb6fe22b" providerId="LiveId" clId="{196519FD-3C64-4461-AC3D-BB99B1B5B961}" dt="2023-02-03T16:06:32.735" v="34811" actId="1076"/>
+        <pc:sldMkLst>
+          <pc:docMk/>
+          <pc:sldMk cId="2517008126" sldId="322"/>
+        </pc:sldMkLst>
+        <pc:spChg chg="mod">
+          <ac:chgData name="urh trinko" userId="3b62f928bb6fe22b" providerId="LiveId" clId="{196519FD-3C64-4461-AC3D-BB99B1B5B961}" dt="2023-02-03T16:02:01.392" v="34711" actId="20577"/>
+          <ac:spMkLst>
+            <pc:docMk/>
+            <pc:sldMk cId="2517008126" sldId="322"/>
+            <ac:spMk id="2" creationId="{DEBA9F98-6671-1574-F69A-0E74F6770B16}"/>
+          </ac:spMkLst>
+        </pc:spChg>
+        <pc:spChg chg="mod">
+          <ac:chgData name="urh trinko" userId="3b62f928bb6fe22b" providerId="LiveId" clId="{196519FD-3C64-4461-AC3D-BB99B1B5B961}" dt="2023-02-03T16:03:00.008" v="34806" actId="14100"/>
+          <ac:spMkLst>
+            <pc:docMk/>
+            <pc:sldMk cId="2517008126" sldId="322"/>
+            <ac:spMk id="3" creationId="{0A6E7F4A-FF69-C193-6663-5E6F0090900D}"/>
+          </ac:spMkLst>
+        </pc:spChg>
+        <pc:picChg chg="add mod">
+          <ac:chgData name="urh trinko" userId="3b62f928bb6fe22b" providerId="LiveId" clId="{196519FD-3C64-4461-AC3D-BB99B1B5B961}" dt="2023-02-03T16:06:32.735" v="34811" actId="1076"/>
+          <ac:picMkLst>
+            <pc:docMk/>
+            <pc:sldMk cId="2517008126" sldId="322"/>
+            <ac:picMk id="5" creationId="{E37C57FF-C7F5-0CF1-4BF2-A945EFE03624}"/>
           </ac:picMkLst>
         </pc:picChg>
       </pc:sldChg>
@@ -2552,7 +2585,7 @@
           <a:p>
             <a:fld id="{4C35B1A2-9590-42BA-8C8F-FDB479B04EEB}" type="datetimeFigureOut">
               <a:rPr lang="sl-SI" smtClean="0"/>
-              <a:t>1. 02. 2023</a:t>
+              <a:t>3. 02. 2023</a:t>
             </a:fld>
             <a:endParaRPr lang="sl-SI"/>
           </a:p>
@@ -2750,7 +2783,7 @@
           <a:p>
             <a:fld id="{4C35B1A2-9590-42BA-8C8F-FDB479B04EEB}" type="datetimeFigureOut">
               <a:rPr lang="sl-SI" smtClean="0"/>
-              <a:t>1. 02. 2023</a:t>
+              <a:t>3. 02. 2023</a:t>
             </a:fld>
             <a:endParaRPr lang="sl-SI"/>
           </a:p>
@@ -2958,7 +2991,7 @@
           <a:p>
             <a:fld id="{4C35B1A2-9590-42BA-8C8F-FDB479B04EEB}" type="datetimeFigureOut">
               <a:rPr lang="sl-SI" smtClean="0"/>
-              <a:t>1. 02. 2023</a:t>
+              <a:t>3. 02. 2023</a:t>
             </a:fld>
             <a:endParaRPr lang="sl-SI"/>
           </a:p>
@@ -3156,7 +3189,7 @@
           <a:p>
             <a:fld id="{4C35B1A2-9590-42BA-8C8F-FDB479B04EEB}" type="datetimeFigureOut">
               <a:rPr lang="sl-SI" smtClean="0"/>
-              <a:t>1. 02. 2023</a:t>
+              <a:t>3. 02. 2023</a:t>
             </a:fld>
             <a:endParaRPr lang="sl-SI"/>
           </a:p>
@@ -3431,7 +3464,7 @@
           <a:p>
             <a:fld id="{4C35B1A2-9590-42BA-8C8F-FDB479B04EEB}" type="datetimeFigureOut">
               <a:rPr lang="sl-SI" smtClean="0"/>
-              <a:t>1. 02. 2023</a:t>
+              <a:t>3. 02. 2023</a:t>
             </a:fld>
             <a:endParaRPr lang="sl-SI"/>
           </a:p>
@@ -3696,7 +3729,7 @@
           <a:p>
             <a:fld id="{4C35B1A2-9590-42BA-8C8F-FDB479B04EEB}" type="datetimeFigureOut">
               <a:rPr lang="sl-SI" smtClean="0"/>
-              <a:t>1. 02. 2023</a:t>
+              <a:t>3. 02. 2023</a:t>
             </a:fld>
             <a:endParaRPr lang="sl-SI"/>
           </a:p>
@@ -4108,7 +4141,7 @@
           <a:p>
             <a:fld id="{4C35B1A2-9590-42BA-8C8F-FDB479B04EEB}" type="datetimeFigureOut">
               <a:rPr lang="sl-SI" smtClean="0"/>
-              <a:t>1. 02. 2023</a:t>
+              <a:t>3. 02. 2023</a:t>
             </a:fld>
             <a:endParaRPr lang="sl-SI"/>
           </a:p>
@@ -4249,7 +4282,7 @@
           <a:p>
             <a:fld id="{4C35B1A2-9590-42BA-8C8F-FDB479B04EEB}" type="datetimeFigureOut">
               <a:rPr lang="sl-SI" smtClean="0"/>
-              <a:t>1. 02. 2023</a:t>
+              <a:t>3. 02. 2023</a:t>
             </a:fld>
             <a:endParaRPr lang="sl-SI"/>
           </a:p>
@@ -4362,7 +4395,7 @@
           <a:p>
             <a:fld id="{4C35B1A2-9590-42BA-8C8F-FDB479B04EEB}" type="datetimeFigureOut">
               <a:rPr lang="sl-SI" smtClean="0"/>
-              <a:t>1. 02. 2023</a:t>
+              <a:t>3. 02. 2023</a:t>
             </a:fld>
             <a:endParaRPr lang="sl-SI"/>
           </a:p>
@@ -4673,7 +4706,7 @@
           <a:p>
             <a:fld id="{4C35B1A2-9590-42BA-8C8F-FDB479B04EEB}" type="datetimeFigureOut">
               <a:rPr lang="sl-SI" smtClean="0"/>
-              <a:t>1. 02. 2023</a:t>
+              <a:t>3. 02. 2023</a:t>
             </a:fld>
             <a:endParaRPr lang="sl-SI"/>
           </a:p>
@@ -4961,7 +4994,7 @@
           <a:p>
             <a:fld id="{4C35B1A2-9590-42BA-8C8F-FDB479B04EEB}" type="datetimeFigureOut">
               <a:rPr lang="sl-SI" smtClean="0"/>
-              <a:t>1. 02. 2023</a:t>
+              <a:t>3. 02. 2023</a:t>
             </a:fld>
             <a:endParaRPr lang="sl-SI"/>
           </a:p>
@@ -5202,7 +5235,7 @@
           <a:p>
             <a:fld id="{4C35B1A2-9590-42BA-8C8F-FDB479B04EEB}" type="datetimeFigureOut">
               <a:rPr lang="sl-SI" smtClean="0"/>
-              <a:t>1. 02. 2023</a:t>
+              <a:t>3. 02. 2023</a:t>
             </a:fld>
             <a:endParaRPr lang="sl-SI"/>
           </a:p>
@@ -15155,6 +15188,145 @@
     <p:extLst>
       <p:ext uri="{BB962C8B-B14F-4D97-AF65-F5344CB8AC3E}">
         <p14:creationId xmlns:p14="http://schemas.microsoft.com/office/powerpoint/2010/main" val="4279281272"/>
+      </p:ext>
+    </p:extLst>
+  </p:cSld>
+  <p:clrMapOvr>
+    <a:masterClrMapping/>
+  </p:clrMapOvr>
+</p:sld>
+</file>
+
+<file path=ppt/slides/slide67.xml><?xml version="1.0" encoding="utf-8"?>
+<p:sld xmlns:a="http://schemas.openxmlformats.org/drawingml/2006/main" xmlns:r="http://schemas.openxmlformats.org/officeDocument/2006/relationships" xmlns:p="http://schemas.openxmlformats.org/presentationml/2006/main">
+  <p:cSld>
+    <p:spTree>
+      <p:nvGrpSpPr>
+        <p:cNvPr id="1" name=""/>
+        <p:cNvGrpSpPr/>
+        <p:nvPr/>
+      </p:nvGrpSpPr>
+      <p:grpSpPr>
+        <a:xfrm>
+          <a:off x="0" y="0"/>
+          <a:ext cx="0" cy="0"/>
+          <a:chOff x="0" y="0"/>
+          <a:chExt cx="0" cy="0"/>
+        </a:xfrm>
+      </p:grpSpPr>
+      <p:sp>
+        <p:nvSpPr>
+          <p:cNvPr id="2" name="Naslov 1">
+            <a:extLst>
+              <a:ext uri="{FF2B5EF4-FFF2-40B4-BE49-F238E27FC236}">
+                <a16:creationId xmlns:a16="http://schemas.microsoft.com/office/drawing/2014/main" id="{DEBA9F98-6671-1574-F69A-0E74F6770B16}"/>
+              </a:ext>
+            </a:extLst>
+          </p:cNvPr>
+          <p:cNvSpPr>
+            <a:spLocks noGrp="1"/>
+          </p:cNvSpPr>
+          <p:nvPr>
+            <p:ph type="title"/>
+          </p:nvPr>
+        </p:nvSpPr>
+        <p:spPr/>
+        <p:txBody>
+          <a:bodyPr/>
+          <a:lstStyle/>
+          <a:p>
+            <a:r>
+              <a:rPr lang="en-SI" dirty="0"/>
+              <a:t>3.2.2023</a:t>
+            </a:r>
+            <a:endParaRPr lang="sl-SI" dirty="0"/>
+          </a:p>
+        </p:txBody>
+      </p:sp>
+      <p:sp>
+        <p:nvSpPr>
+          <p:cNvPr id="3" name="Označba mesta vsebine 2">
+            <a:extLst>
+              <a:ext uri="{FF2B5EF4-FFF2-40B4-BE49-F238E27FC236}">
+                <a16:creationId xmlns:a16="http://schemas.microsoft.com/office/drawing/2014/main" id="{0A6E7F4A-FF69-C193-6663-5E6F0090900D}"/>
+              </a:ext>
+            </a:extLst>
+          </p:cNvPr>
+          <p:cNvSpPr>
+            <a:spLocks noGrp="1"/>
+          </p:cNvSpPr>
+          <p:nvPr>
+            <p:ph idx="1"/>
+          </p:nvPr>
+        </p:nvSpPr>
+        <p:spPr>
+          <a:xfrm>
+            <a:off x="838199" y="1825625"/>
+            <a:ext cx="4615543" cy="3660775"/>
+          </a:xfrm>
+        </p:spPr>
+        <p:txBody>
+          <a:bodyPr>
+            <a:normAutofit/>
+          </a:bodyPr>
+          <a:lstStyle/>
+          <a:p>
+            <a:r>
+              <a:rPr lang="en-SI" dirty="0"/>
+              <a:t>I improved the appearance of </a:t>
+            </a:r>
+            <a:r>
+              <a:rPr lang="en-SI" dirty="0" err="1"/>
+              <a:t>thr</a:t>
+            </a:r>
+            <a:r>
+              <a:rPr lang="en-SI" dirty="0"/>
+              <a:t> detector simulation GUI and gave it more functionality.</a:t>
+            </a:r>
+            <a:endParaRPr lang="sl-SI" dirty="0"/>
+          </a:p>
+        </p:txBody>
+      </p:sp>
+      <p:pic>
+        <p:nvPicPr>
+          <p:cNvPr id="5" name="Slika 4" descr="Slika, ki vsebuje besede besedilo, kalkulator, posnetek zaslona&#10;&#10;Opis je samodejno ustvarjen">
+            <a:extLst>
+              <a:ext uri="{FF2B5EF4-FFF2-40B4-BE49-F238E27FC236}">
+                <a16:creationId xmlns:a16="http://schemas.microsoft.com/office/drawing/2014/main" id="{E37C57FF-C7F5-0CF1-4BF2-A945EFE03624}"/>
+              </a:ext>
+            </a:extLst>
+          </p:cNvPr>
+          <p:cNvPicPr>
+            <a:picLocks noChangeAspect="1"/>
+          </p:cNvPicPr>
+          <p:nvPr/>
+        </p:nvPicPr>
+        <p:blipFill>
+          <a:blip r:embed="rId2">
+            <a:extLst>
+              <a:ext uri="{28A0092B-C50C-407E-A947-70E740481C1C}">
+                <a14:useLocalDpi xmlns:a14="http://schemas.microsoft.com/office/drawing/2010/main" val="0"/>
+              </a:ext>
+            </a:extLst>
+          </a:blip>
+          <a:stretch>
+            <a:fillRect/>
+          </a:stretch>
+        </p:blipFill>
+        <p:spPr>
+          <a:xfrm>
+            <a:off x="6847956" y="816059"/>
+            <a:ext cx="2992729" cy="5225882"/>
+          </a:xfrm>
+          <a:prstGeom prst="rect">
+            <a:avLst/>
+          </a:prstGeom>
+        </p:spPr>
+      </p:pic>
+    </p:spTree>
+    <p:extLst>
+      <p:ext uri="{BB962C8B-B14F-4D97-AF65-F5344CB8AC3E}">
+        <p14:creationId xmlns:p14="http://schemas.microsoft.com/office/powerpoint/2010/main" val="2517008126"/>
       </p:ext>
     </p:extLst>
   </p:cSld>

</xml_diff>

<commit_message>
Find Source GUI 2.0
</commit_message>
<xml_diff>
--- a/reports/work_diary.pptx
+++ b/reports/work_diary.pptx
@@ -72,6 +72,7 @@
     <p:sldId id="320" r:id="rId66"/>
     <p:sldId id="321" r:id="rId67"/>
     <p:sldId id="322" r:id="rId68"/>
+    <p:sldId id="323" r:id="rId69"/>
   </p:sldIdLst>
   <p:sldSz cx="12192000" cy="6858000"/>
   <p:notesSz cx="6858000" cy="9144000"/>
@@ -242,6 +243,7 @@
             <p14:sldId id="320"/>
             <p14:sldId id="321"/>
             <p14:sldId id="322"/>
+            <p14:sldId id="323"/>
           </p14:sldIdLst>
         </p14:section>
       </p14:sectionLst>
@@ -266,7 +268,7 @@
   <pc:docChgLst>
     <pc:chgData name="urh trinko" userId="3b62f928bb6fe22b" providerId="LiveId" clId="{196519FD-3C64-4461-AC3D-BB99B1B5B961}"/>
     <pc:docChg chg="undo custSel addSld delSld modSld addSection delSection modSection">
-      <pc:chgData name="urh trinko" userId="3b62f928bb6fe22b" providerId="LiveId" clId="{196519FD-3C64-4461-AC3D-BB99B1B5B961}" dt="2023-02-03T16:06:32.735" v="34811" actId="1076"/>
+      <pc:chgData name="urh trinko" userId="3b62f928bb6fe22b" providerId="LiveId" clId="{196519FD-3C64-4461-AC3D-BB99B1B5B961}" dt="2023-02-06T14:49:36.080" v="35332" actId="20577"/>
       <pc:docMkLst>
         <pc:docMk/>
       </pc:docMkLst>
@@ -2432,6 +2434,29 @@
             <ac:picMk id="5" creationId="{E37C57FF-C7F5-0CF1-4BF2-A945EFE03624}"/>
           </ac:picMkLst>
         </pc:picChg>
+      </pc:sldChg>
+      <pc:sldChg chg="modSp new mod">
+        <pc:chgData name="urh trinko" userId="3b62f928bb6fe22b" providerId="LiveId" clId="{196519FD-3C64-4461-AC3D-BB99B1B5B961}" dt="2023-02-06T14:49:36.080" v="35332" actId="20577"/>
+        <pc:sldMkLst>
+          <pc:docMk/>
+          <pc:sldMk cId="2703608424" sldId="323"/>
+        </pc:sldMkLst>
+        <pc:spChg chg="mod">
+          <ac:chgData name="urh trinko" userId="3b62f928bb6fe22b" providerId="LiveId" clId="{196519FD-3C64-4461-AC3D-BB99B1B5B961}" dt="2023-02-06T14:43:31.585" v="34824" actId="20577"/>
+          <ac:spMkLst>
+            <pc:docMk/>
+            <pc:sldMk cId="2703608424" sldId="323"/>
+            <ac:spMk id="2" creationId="{3A8438C8-2EEE-306D-F40C-57392EAD2CE2}"/>
+          </ac:spMkLst>
+        </pc:spChg>
+        <pc:spChg chg="mod">
+          <ac:chgData name="urh trinko" userId="3b62f928bb6fe22b" providerId="LiveId" clId="{196519FD-3C64-4461-AC3D-BB99B1B5B961}" dt="2023-02-06T14:49:36.080" v="35332" actId="20577"/>
+          <ac:spMkLst>
+            <pc:docMk/>
+            <pc:sldMk cId="2703608424" sldId="323"/>
+            <ac:spMk id="3" creationId="{72BD97A8-CED3-F2AF-75AD-7E66322D1415}"/>
+          </ac:spMkLst>
+        </pc:spChg>
       </pc:sldChg>
     </pc:docChg>
   </pc:docChgLst>
@@ -2585,7 +2610,7 @@
           <a:p>
             <a:fld id="{4C35B1A2-9590-42BA-8C8F-FDB479B04EEB}" type="datetimeFigureOut">
               <a:rPr lang="sl-SI" smtClean="0"/>
-              <a:t>3. 02. 2023</a:t>
+              <a:t>6. 02. 2023</a:t>
             </a:fld>
             <a:endParaRPr lang="sl-SI"/>
           </a:p>
@@ -2783,7 +2808,7 @@
           <a:p>
             <a:fld id="{4C35B1A2-9590-42BA-8C8F-FDB479B04EEB}" type="datetimeFigureOut">
               <a:rPr lang="sl-SI" smtClean="0"/>
-              <a:t>3. 02. 2023</a:t>
+              <a:t>6. 02. 2023</a:t>
             </a:fld>
             <a:endParaRPr lang="sl-SI"/>
           </a:p>
@@ -2991,7 +3016,7 @@
           <a:p>
             <a:fld id="{4C35B1A2-9590-42BA-8C8F-FDB479B04EEB}" type="datetimeFigureOut">
               <a:rPr lang="sl-SI" smtClean="0"/>
-              <a:t>3. 02. 2023</a:t>
+              <a:t>6. 02. 2023</a:t>
             </a:fld>
             <a:endParaRPr lang="sl-SI"/>
           </a:p>
@@ -3189,7 +3214,7 @@
           <a:p>
             <a:fld id="{4C35B1A2-9590-42BA-8C8F-FDB479B04EEB}" type="datetimeFigureOut">
               <a:rPr lang="sl-SI" smtClean="0"/>
-              <a:t>3. 02. 2023</a:t>
+              <a:t>6. 02. 2023</a:t>
             </a:fld>
             <a:endParaRPr lang="sl-SI"/>
           </a:p>
@@ -3464,7 +3489,7 @@
           <a:p>
             <a:fld id="{4C35B1A2-9590-42BA-8C8F-FDB479B04EEB}" type="datetimeFigureOut">
               <a:rPr lang="sl-SI" smtClean="0"/>
-              <a:t>3. 02. 2023</a:t>
+              <a:t>6. 02. 2023</a:t>
             </a:fld>
             <a:endParaRPr lang="sl-SI"/>
           </a:p>
@@ -3729,7 +3754,7 @@
           <a:p>
             <a:fld id="{4C35B1A2-9590-42BA-8C8F-FDB479B04EEB}" type="datetimeFigureOut">
               <a:rPr lang="sl-SI" smtClean="0"/>
-              <a:t>3. 02. 2023</a:t>
+              <a:t>6. 02. 2023</a:t>
             </a:fld>
             <a:endParaRPr lang="sl-SI"/>
           </a:p>
@@ -4141,7 +4166,7 @@
           <a:p>
             <a:fld id="{4C35B1A2-9590-42BA-8C8F-FDB479B04EEB}" type="datetimeFigureOut">
               <a:rPr lang="sl-SI" smtClean="0"/>
-              <a:t>3. 02. 2023</a:t>
+              <a:t>6. 02. 2023</a:t>
             </a:fld>
             <a:endParaRPr lang="sl-SI"/>
           </a:p>
@@ -4282,7 +4307,7 @@
           <a:p>
             <a:fld id="{4C35B1A2-9590-42BA-8C8F-FDB479B04EEB}" type="datetimeFigureOut">
               <a:rPr lang="sl-SI" smtClean="0"/>
-              <a:t>3. 02. 2023</a:t>
+              <a:t>6. 02. 2023</a:t>
             </a:fld>
             <a:endParaRPr lang="sl-SI"/>
           </a:p>
@@ -4395,7 +4420,7 @@
           <a:p>
             <a:fld id="{4C35B1A2-9590-42BA-8C8F-FDB479B04EEB}" type="datetimeFigureOut">
               <a:rPr lang="sl-SI" smtClean="0"/>
-              <a:t>3. 02. 2023</a:t>
+              <a:t>6. 02. 2023</a:t>
             </a:fld>
             <a:endParaRPr lang="sl-SI"/>
           </a:p>
@@ -4706,7 +4731,7 @@
           <a:p>
             <a:fld id="{4C35B1A2-9590-42BA-8C8F-FDB479B04EEB}" type="datetimeFigureOut">
               <a:rPr lang="sl-SI" smtClean="0"/>
-              <a:t>3. 02. 2023</a:t>
+              <a:t>6. 02. 2023</a:t>
             </a:fld>
             <a:endParaRPr lang="sl-SI"/>
           </a:p>
@@ -4994,7 +5019,7 @@
           <a:p>
             <a:fld id="{4C35B1A2-9590-42BA-8C8F-FDB479B04EEB}" type="datetimeFigureOut">
               <a:rPr lang="sl-SI" smtClean="0"/>
-              <a:t>3. 02. 2023</a:t>
+              <a:t>6. 02. 2023</a:t>
             </a:fld>
             <a:endParaRPr lang="sl-SI"/>
           </a:p>
@@ -5235,7 +5260,7 @@
           <a:p>
             <a:fld id="{4C35B1A2-9590-42BA-8C8F-FDB479B04EEB}" type="datetimeFigureOut">
               <a:rPr lang="sl-SI" smtClean="0"/>
-              <a:t>3. 02. 2023</a:t>
+              <a:t>6. 02. 2023</a:t>
             </a:fld>
             <a:endParaRPr lang="sl-SI"/>
           </a:p>
@@ -15327,6 +15352,142 @@
     <p:extLst>
       <p:ext uri="{BB962C8B-B14F-4D97-AF65-F5344CB8AC3E}">
         <p14:creationId xmlns:p14="http://schemas.microsoft.com/office/powerpoint/2010/main" val="2517008126"/>
+      </p:ext>
+    </p:extLst>
+  </p:cSld>
+  <p:clrMapOvr>
+    <a:masterClrMapping/>
+  </p:clrMapOvr>
+</p:sld>
+</file>
+
+<file path=ppt/slides/slide68.xml><?xml version="1.0" encoding="utf-8"?>
+<p:sld xmlns:a="http://schemas.openxmlformats.org/drawingml/2006/main" xmlns:r="http://schemas.openxmlformats.org/officeDocument/2006/relationships" xmlns:p="http://schemas.openxmlformats.org/presentationml/2006/main">
+  <p:cSld>
+    <p:spTree>
+      <p:nvGrpSpPr>
+        <p:cNvPr id="1" name=""/>
+        <p:cNvGrpSpPr/>
+        <p:nvPr/>
+      </p:nvGrpSpPr>
+      <p:grpSpPr>
+        <a:xfrm>
+          <a:off x="0" y="0"/>
+          <a:ext cx="0" cy="0"/>
+          <a:chOff x="0" y="0"/>
+          <a:chExt cx="0" cy="0"/>
+        </a:xfrm>
+      </p:grpSpPr>
+      <p:sp>
+        <p:nvSpPr>
+          <p:cNvPr id="2" name="Naslov 1">
+            <a:extLst>
+              <a:ext uri="{FF2B5EF4-FFF2-40B4-BE49-F238E27FC236}">
+                <a16:creationId xmlns:a16="http://schemas.microsoft.com/office/drawing/2014/main" id="{3A8438C8-2EEE-306D-F40C-57392EAD2CE2}"/>
+              </a:ext>
+            </a:extLst>
+          </p:cNvPr>
+          <p:cNvSpPr>
+            <a:spLocks noGrp="1"/>
+          </p:cNvSpPr>
+          <p:nvPr>
+            <p:ph type="title"/>
+          </p:nvPr>
+        </p:nvSpPr>
+        <p:spPr/>
+        <p:txBody>
+          <a:bodyPr/>
+          <a:lstStyle/>
+          <a:p>
+            <a:r>
+              <a:rPr lang="en-SI" dirty="0"/>
+              <a:t>6.2.2023</a:t>
+            </a:r>
+            <a:endParaRPr lang="sl-SI" dirty="0"/>
+          </a:p>
+        </p:txBody>
+      </p:sp>
+      <p:sp>
+        <p:nvSpPr>
+          <p:cNvPr id="3" name="Označba mesta vsebine 2">
+            <a:extLst>
+              <a:ext uri="{FF2B5EF4-FFF2-40B4-BE49-F238E27FC236}">
+                <a16:creationId xmlns:a16="http://schemas.microsoft.com/office/drawing/2014/main" id="{72BD97A8-CED3-F2AF-75AD-7E66322D1415}"/>
+              </a:ext>
+            </a:extLst>
+          </p:cNvPr>
+          <p:cNvSpPr>
+            <a:spLocks noGrp="1"/>
+          </p:cNvSpPr>
+          <p:nvPr>
+            <p:ph idx="1"/>
+          </p:nvPr>
+        </p:nvSpPr>
+        <p:spPr/>
+        <p:txBody>
+          <a:bodyPr/>
+          <a:lstStyle/>
+          <a:p>
+            <a:r>
+              <a:rPr lang="en-SI" dirty="0"/>
+              <a:t>Making a imp</a:t>
+            </a:r>
+            <a:r>
+              <a:rPr lang="en-GB" dirty="0" err="1"/>
+              <a:t>ro</a:t>
+            </a:r>
+            <a:r>
+              <a:rPr lang="en-SI" dirty="0" err="1"/>
+              <a:t>ved</a:t>
+            </a:r>
+            <a:r>
+              <a:rPr lang="en-SI" dirty="0"/>
+              <a:t> GUI for locating a radioactive source from measurements.</a:t>
+            </a:r>
+          </a:p>
+          <a:p>
+            <a:r>
+              <a:rPr lang="en-SI" dirty="0"/>
+              <a:t>The idea is to have a NEXT and BACK button with which the user can traverse through the positions of measurement in a zig-zag pattern.</a:t>
+            </a:r>
+          </a:p>
+          <a:p>
+            <a:r>
+              <a:rPr lang="en-SI" dirty="0"/>
+              <a:t>Biggest </a:t>
+            </a:r>
+            <a:r>
+              <a:rPr lang="en-SI" dirty="0" err="1"/>
+              <a:t>obst</a:t>
+            </a:r>
+            <a:r>
+              <a:rPr lang="en-GB" dirty="0"/>
+              <a:t>a</a:t>
+            </a:r>
+            <a:r>
+              <a:rPr lang="en-SI" dirty="0" err="1"/>
+              <a:t>cle</a:t>
+            </a:r>
+            <a:r>
+              <a:rPr lang="en-SI" dirty="0"/>
+              <a:t> for now is how exactly to deal with the problem of saving the HDs and </a:t>
+            </a:r>
+            <a:r>
+              <a:rPr lang="en-SI" dirty="0" err="1"/>
+              <a:t>dHDs</a:t>
+            </a:r>
+            <a:r>
+              <a:rPr lang="en-SI" dirty="0"/>
+              <a:t> array when the GUI is closed.</a:t>
+            </a:r>
+            <a:endParaRPr lang="sl-SI" dirty="0"/>
+          </a:p>
+        </p:txBody>
+      </p:sp>
+    </p:spTree>
+    <p:extLst>
+      <p:ext uri="{BB962C8B-B14F-4D97-AF65-F5344CB8AC3E}">
+        <p14:creationId xmlns:p14="http://schemas.microsoft.com/office/powerpoint/2010/main" val="2703608424"/>
       </p:ext>
     </p:extLst>
   </p:cSld>

</xml_diff>